<commit_message>
reworking some of the first two weeks of material to integrate more smoothly
</commit_message>
<xml_diff>
--- a/ClassMaterials/ArraysAnd2DArrays/Slides/Part2-JavaBuiltInArrays.pptx
+++ b/ClassMaterials/ArraysAnd2DArrays/Slides/Part2-JavaBuiltInArrays.pptx
@@ -5,7 +5,7 @@
     <p:sldMasterId id="2147483648" r:id="rId1"/>
   </p:sldMasterIdLst>
   <p:notesMasterIdLst>
-    <p:notesMasterId r:id="rId14"/>
+    <p:notesMasterId r:id="rId13"/>
   </p:notesMasterIdLst>
   <p:sldIdLst>
     <p:sldId id="310" r:id="rId2"/>
@@ -17,9 +17,8 @@
     <p:sldId id="262" r:id="rId8"/>
     <p:sldId id="263" r:id="rId9"/>
     <p:sldId id="320" r:id="rId10"/>
-    <p:sldId id="315" r:id="rId11"/>
-    <p:sldId id="264" r:id="rId12"/>
-    <p:sldId id="273" r:id="rId13"/>
+    <p:sldId id="264" r:id="rId11"/>
+    <p:sldId id="273" r:id="rId12"/>
   </p:sldIdLst>
   <p:sldSz cx="9144000" cy="6858000" type="screen4x3"/>
   <p:notesSz cx="6858000" cy="9144000"/>
@@ -3536,7 +3535,7 @@
           </a:ln>
           <a:extLst>
             <a:ext uri="{C572A759-6A51-4108-AA02-DFA0A04FC94B}">
-              <ma14:wrappingTextBoxFlag xmlns:ma14="http://schemas.microsoft.com/office/mac/drawingml/2011/main" xmlns="" val="1"/>
+              <ma14:wrappingTextBoxFlag xmlns="" xmlns:ma14="http://schemas.microsoft.com/office/mac/drawingml/2011/main" val="1"/>
             </a:ext>
           </a:extLst>
         </p:spPr>
@@ -3579,7 +3578,7 @@
           </a:ln>
           <a:extLst>
             <a:ext uri="{C572A759-6A51-4108-AA02-DFA0A04FC94B}">
-              <ma14:wrappingTextBoxFlag xmlns:ma14="http://schemas.microsoft.com/office/mac/drawingml/2011/main" xmlns="" val="1"/>
+              <ma14:wrappingTextBoxFlag xmlns="" xmlns:ma14="http://schemas.microsoft.com/office/mac/drawingml/2011/main" val="1"/>
             </a:ext>
           </a:extLst>
         </p:spPr>
@@ -4069,7 +4068,7 @@
           </a:ln>
           <a:extLst>
             <a:ext uri="{C572A759-6A51-4108-AA02-DFA0A04FC94B}">
-              <ma14:wrappingTextBoxFlag xmlns:ma14="http://schemas.microsoft.com/office/mac/drawingml/2011/main" xmlns="" val="1"/>
+              <ma14:wrappingTextBoxFlag xmlns="" xmlns:ma14="http://schemas.microsoft.com/office/mac/drawingml/2011/main" val="1"/>
             </a:ext>
           </a:extLst>
         </p:spPr>
@@ -4208,11 +4207,14 @@
               </a:rPr>
               <a:t>Arrays</a:t>
             </a:r>
-            <a:endParaRPr lang="en-US" sz="3600" dirty="0">
-              <a:solidFill>
-                <a:srgbClr val="888888"/>
-              </a:solidFill>
-            </a:endParaRPr>
+            <a:r>
+              <a:rPr lang="en-US" sz="3600" dirty="0">
+                <a:solidFill>
+                  <a:srgbClr val="888888"/>
+                </a:solidFill>
+              </a:rPr>
+              <a:t> (primitives only)</a:t>
+            </a:r>
           </a:p>
           <a:p>
             <a:pPr lvl="0">
@@ -4270,846 +4272,6 @@
 </file>
 
 <file path=ppt/slides/slide10.xml><?xml version="1.0" encoding="utf-8"?>
-<p:sld xmlns:a="http://schemas.openxmlformats.org/drawingml/2006/main" xmlns:r="http://schemas.openxmlformats.org/officeDocument/2006/relationships" xmlns:p="http://schemas.openxmlformats.org/presentationml/2006/main">
-  <p:cSld>
-    <p:spTree>
-      <p:nvGrpSpPr>
-        <p:cNvPr id="1" name=""/>
-        <p:cNvGrpSpPr/>
-        <p:nvPr/>
-      </p:nvGrpSpPr>
-      <p:grpSpPr>
-        <a:xfrm>
-          <a:off x="0" y="0"/>
-          <a:ext cx="0" cy="0"/>
-          <a:chOff x="0" y="0"/>
-          <a:chExt cx="0" cy="0"/>
-        </a:xfrm>
-      </p:grpSpPr>
-      <p:sp>
-        <p:nvSpPr>
-          <p:cNvPr id="3" name="Text Placeholder 2"/>
-          <p:cNvSpPr>
-            <a:spLocks noGrp="1"/>
-          </p:cNvSpPr>
-          <p:nvPr>
-            <p:ph type="body" idx="1"/>
-          </p:nvPr>
-        </p:nvSpPr>
-        <p:spPr>
-          <a:xfrm>
-            <a:off x="734291" y="91721"/>
-            <a:ext cx="8229600" cy="856673"/>
-          </a:xfrm>
-        </p:spPr>
-        <p:txBody>
-          <a:bodyPr>
-            <a:noAutofit/>
-          </a:bodyPr>
-          <a:lstStyle/>
-          <a:p>
-            <a:pPr marL="457200" lvl="1" indent="0">
-              <a:lnSpc>
-                <a:spcPct val="80000"/>
-              </a:lnSpc>
-              <a:spcBef>
-                <a:spcPts val="500"/>
-              </a:spcBef>
-              <a:buClr>
-                <a:srgbClr val="9BBB59"/>
-              </a:buClr>
-              <a:buNone/>
-              <a:defRPr sz="1800"/>
-            </a:pPr>
-            <a:r>
-              <a:rPr lang="en-US" sz="3600" b="1" dirty="0">
-                <a:solidFill>
-                  <a:schemeClr val="tx1"/>
-                </a:solidFill>
-                <a:latin typeface="Courier New" panose="02070309020205020404" pitchFamily="49" charset="0"/>
-                <a:ea typeface="Consolas"/>
-                <a:cs typeface="Courier New" panose="02070309020205020404" pitchFamily="49" charset="0"/>
-                <a:sym typeface="Consolas"/>
-              </a:rPr>
-              <a:t>Dog[] </a:t>
-            </a:r>
-            <a:r>
-              <a:rPr lang="en-US" sz="3600" dirty="0">
-                <a:solidFill>
-                  <a:schemeClr val="tx1"/>
-                </a:solidFill>
-                <a:latin typeface="Courier New" panose="02070309020205020404" pitchFamily="49" charset="0"/>
-                <a:ea typeface="Consolas"/>
-                <a:cs typeface="Courier New" panose="02070309020205020404" pitchFamily="49" charset="0"/>
-                <a:sym typeface="Consolas"/>
-              </a:rPr>
-              <a:t>dogs</a:t>
-            </a:r>
-            <a:r>
-              <a:rPr lang="en-US" sz="3600" b="1" dirty="0">
-                <a:solidFill>
-                  <a:schemeClr val="tx1"/>
-                </a:solidFill>
-                <a:latin typeface="Courier New" panose="02070309020205020404" pitchFamily="49" charset="0"/>
-                <a:ea typeface="Consolas"/>
-                <a:cs typeface="Courier New" panose="02070309020205020404" pitchFamily="49" charset="0"/>
-                <a:sym typeface="Consolas"/>
-              </a:rPr>
-              <a:t> = new </a:t>
-            </a:r>
-            <a:r>
-              <a:rPr lang="en-US" sz="3600" dirty="0">
-                <a:solidFill>
-                  <a:schemeClr val="tx1"/>
-                </a:solidFill>
-                <a:latin typeface="Courier New" panose="02070309020205020404" pitchFamily="49" charset="0"/>
-                <a:ea typeface="Consolas"/>
-                <a:cs typeface="Courier New" panose="02070309020205020404" pitchFamily="49" charset="0"/>
-                <a:sym typeface="Consolas"/>
-              </a:rPr>
-              <a:t>Dog[10]</a:t>
-            </a:r>
-            <a:r>
-              <a:rPr lang="en-US" sz="3600" b="1" dirty="0">
-                <a:solidFill>
-                  <a:schemeClr val="tx1"/>
-                </a:solidFill>
-                <a:latin typeface="Courier New" panose="02070309020205020404" pitchFamily="49" charset="0"/>
-                <a:ea typeface="Consolas"/>
-                <a:cs typeface="Courier New" panose="02070309020205020404" pitchFamily="49" charset="0"/>
-                <a:sym typeface="Consolas"/>
-              </a:rPr>
-              <a:t>;</a:t>
-            </a:r>
-          </a:p>
-        </p:txBody>
-      </p:sp>
-      <p:sp>
-        <p:nvSpPr>
-          <p:cNvPr id="4" name="Slide Number Placeholder 3"/>
-          <p:cNvSpPr>
-            <a:spLocks noGrp="1"/>
-          </p:cNvSpPr>
-          <p:nvPr>
-            <p:ph type="sldNum" sz="quarter" idx="2"/>
-          </p:nvPr>
-        </p:nvSpPr>
-        <p:spPr/>
-        <p:txBody>
-          <a:bodyPr/>
-          <a:lstStyle/>
-          <a:p>
-            <a:pPr lvl="0"/>
-            <a:fld id="{86CB4B4D-7CA3-9044-876B-883B54F8677D}" type="slidenum">
-              <a:rPr lang="en-US" smtClean="0"/>
-              <a:t>10</a:t>
-            </a:fld>
-            <a:endParaRPr lang="en-US"/>
-          </a:p>
-        </p:txBody>
-      </p:sp>
-      <p:pic>
-        <p:nvPicPr>
-          <p:cNvPr id="1026" name="Picture 2" descr="https://image.shutterstock.com/image-photo/outdoor-dog-kennels-outside-building-260nw-630941654.jpg"/>
-          <p:cNvPicPr>
-            <a:picLocks noChangeAspect="1" noChangeArrowheads="1"/>
-          </p:cNvPicPr>
-          <p:nvPr/>
-        </p:nvPicPr>
-        <p:blipFill>
-          <a:blip r:embed="rId2">
-            <a:extLst>
-              <a:ext uri="{28A0092B-C50C-407E-A947-70E740481C1C}">
-                <a14:useLocalDpi xmlns:a14="http://schemas.microsoft.com/office/drawing/2010/main" val="0"/>
-              </a:ext>
-            </a:extLst>
-          </a:blip>
-          <a:srcRect/>
-          <a:stretch>
-            <a:fillRect/>
-          </a:stretch>
-        </p:blipFill>
-        <p:spPr bwMode="auto">
-          <a:xfrm>
-            <a:off x="1648252" y="1689451"/>
-            <a:ext cx="5218545" cy="3756279"/>
-          </a:xfrm>
-          <a:prstGeom prst="rect">
-            <a:avLst/>
-          </a:prstGeom>
-          <a:noFill/>
-          <a:extLst>
-            <a:ext uri="{909E8E84-426E-40DD-AFC4-6F175D3DCCD1}">
-              <a14:hiddenFill xmlns:a14="http://schemas.microsoft.com/office/drawing/2010/main">
-                <a:solidFill>
-                  <a:srgbClr val="FFFFFF"/>
-                </a:solidFill>
-              </a14:hiddenFill>
-            </a:ext>
-          </a:extLst>
-        </p:spPr>
-      </p:pic>
-      <p:sp>
-        <p:nvSpPr>
-          <p:cNvPr id="5" name="Rectangle 4"/>
-          <p:cNvSpPr/>
-          <p:nvPr/>
-        </p:nvSpPr>
-        <p:spPr>
-          <a:xfrm>
-            <a:off x="867779" y="673788"/>
-            <a:ext cx="7666181" cy="830997"/>
-          </a:xfrm>
-          <a:prstGeom prst="rect">
-            <a:avLst/>
-          </a:prstGeom>
-        </p:spPr>
-        <p:txBody>
-          <a:bodyPr wrap="square">
-            <a:spAutoFit/>
-          </a:bodyPr>
-          <a:lstStyle/>
-          <a:p>
-            <a:pPr lvl="0" algn="ctr"/>
-            <a:r>
-              <a:rPr lang="en-US" sz="2400" dirty="0">
-                <a:solidFill>
-                  <a:schemeClr val="tx1"/>
-                </a:solidFill>
-              </a:rPr>
-              <a:t>This does </a:t>
-            </a:r>
-            <a:r>
-              <a:rPr lang="en-US" sz="2400" u="sng" dirty="0">
-                <a:solidFill>
-                  <a:schemeClr val="tx1"/>
-                </a:solidFill>
-              </a:rPr>
-              <a:t>NOT</a:t>
-            </a:r>
-            <a:r>
-              <a:rPr lang="en-US" sz="2400" dirty="0">
-                <a:solidFill>
-                  <a:schemeClr val="tx1"/>
-                </a:solidFill>
-              </a:rPr>
-              <a:t> construct any Dogs.  It just allocates space for referring to Dogs (all the Dogs start out as null )</a:t>
-            </a:r>
-          </a:p>
-        </p:txBody>
-      </p:sp>
-      <p:sp>
-        <p:nvSpPr>
-          <p:cNvPr id="6" name="Rectangle 5"/>
-          <p:cNvSpPr/>
-          <p:nvPr/>
-        </p:nvSpPr>
-        <p:spPr>
-          <a:xfrm>
-            <a:off x="1131455" y="5449534"/>
-            <a:ext cx="7832436" cy="563231"/>
-          </a:xfrm>
-          <a:prstGeom prst="rect">
-            <a:avLst/>
-          </a:prstGeom>
-        </p:spPr>
-        <p:txBody>
-          <a:bodyPr wrap="square">
-            <a:spAutoFit/>
-          </a:bodyPr>
-          <a:lstStyle/>
-          <a:p>
-            <a:pPr marL="457200" lvl="1" indent="0">
-              <a:lnSpc>
-                <a:spcPct val="80000"/>
-              </a:lnSpc>
-              <a:spcBef>
-                <a:spcPts val="500"/>
-              </a:spcBef>
-              <a:buClr>
-                <a:srgbClr val="9BBB59"/>
-              </a:buClr>
-              <a:buNone/>
-              <a:defRPr sz="1800"/>
-            </a:pPr>
-            <a:r>
-              <a:rPr lang="en-US" sz="3600" dirty="0">
-                <a:solidFill>
-                  <a:schemeClr val="tx1"/>
-                </a:solidFill>
-                <a:latin typeface="Courier New" panose="02070309020205020404" pitchFamily="49" charset="0"/>
-                <a:ea typeface="Consolas"/>
-                <a:cs typeface="Courier New" panose="02070309020205020404" pitchFamily="49" charset="0"/>
-                <a:sym typeface="Consolas"/>
-              </a:rPr>
-              <a:t>dogs[0]</a:t>
-            </a:r>
-            <a:r>
-              <a:rPr lang="en-US" sz="3600" b="1" dirty="0">
-                <a:solidFill>
-                  <a:schemeClr val="tx1"/>
-                </a:solidFill>
-                <a:latin typeface="Courier New" panose="02070309020205020404" pitchFamily="49" charset="0"/>
-                <a:ea typeface="Consolas"/>
-                <a:cs typeface="Courier New" panose="02070309020205020404" pitchFamily="49" charset="0"/>
-                <a:sym typeface="Consolas"/>
-              </a:rPr>
-              <a:t> = new </a:t>
-            </a:r>
-            <a:r>
-              <a:rPr lang="en-US" sz="3600" dirty="0">
-                <a:solidFill>
-                  <a:schemeClr val="tx1"/>
-                </a:solidFill>
-                <a:latin typeface="Courier New" panose="02070309020205020404" pitchFamily="49" charset="0"/>
-                <a:ea typeface="Consolas"/>
-                <a:cs typeface="Courier New" panose="02070309020205020404" pitchFamily="49" charset="0"/>
-                <a:sym typeface="Consolas"/>
-              </a:rPr>
-              <a:t>Dog();</a:t>
-            </a:r>
-          </a:p>
-        </p:txBody>
-      </p:sp>
-      <p:sp>
-        <p:nvSpPr>
-          <p:cNvPr id="10" name="Rectangle 9"/>
-          <p:cNvSpPr/>
-          <p:nvPr/>
-        </p:nvSpPr>
-        <p:spPr>
-          <a:xfrm>
-            <a:off x="867779" y="5920828"/>
-            <a:ext cx="7666181" cy="830997"/>
-          </a:xfrm>
-          <a:prstGeom prst="rect">
-            <a:avLst/>
-          </a:prstGeom>
-        </p:spPr>
-        <p:txBody>
-          <a:bodyPr wrap="square">
-            <a:spAutoFit/>
-          </a:bodyPr>
-          <a:lstStyle/>
-          <a:p>
-            <a:pPr lvl="0" algn="ctr"/>
-            <a:r>
-              <a:rPr lang="en-US" sz="2400" dirty="0">
-                <a:solidFill>
-                  <a:schemeClr val="tx1"/>
-                </a:solidFill>
-              </a:rPr>
-              <a:t>This does construct ONE Dog and places it in the first position of the array (first kennel).  </a:t>
-            </a:r>
-          </a:p>
-        </p:txBody>
-      </p:sp>
-      <p:sp>
-        <p:nvSpPr>
-          <p:cNvPr id="12" name="Rectangle 11"/>
-          <p:cNvSpPr/>
-          <p:nvPr/>
-        </p:nvSpPr>
-        <p:spPr>
-          <a:xfrm>
-            <a:off x="4125626" y="3899482"/>
-            <a:ext cx="922047" cy="461665"/>
-          </a:xfrm>
-          <a:prstGeom prst="rect">
-            <a:avLst/>
-          </a:prstGeom>
-        </p:spPr>
-        <p:txBody>
-          <a:bodyPr wrap="none">
-            <a:spAutoFit/>
-          </a:bodyPr>
-          <a:lstStyle/>
-          <a:p>
-            <a:r>
-              <a:rPr lang="en-US" sz="2400" b="1" dirty="0">
-                <a:solidFill>
-                  <a:schemeClr val="tx1"/>
-                </a:solidFill>
-                <a:latin typeface="Courier New" panose="02070309020205020404" pitchFamily="49" charset="0"/>
-                <a:ea typeface="Consolas"/>
-                <a:cs typeface="Courier New" panose="02070309020205020404" pitchFamily="49" charset="0"/>
-                <a:sym typeface="Consolas"/>
-              </a:rPr>
-              <a:t>null</a:t>
-            </a:r>
-            <a:endParaRPr lang="en-US" sz="2400" b="1" dirty="0">
-              <a:solidFill>
-                <a:schemeClr val="tx1"/>
-              </a:solidFill>
-            </a:endParaRPr>
-          </a:p>
-        </p:txBody>
-      </p:sp>
-      <p:pic>
-        <p:nvPicPr>
-          <p:cNvPr id="7" name="Picture 6"/>
-          <p:cNvPicPr>
-            <a:picLocks noChangeAspect="1"/>
-          </p:cNvPicPr>
-          <p:nvPr/>
-        </p:nvPicPr>
-        <p:blipFill>
-          <a:blip r:embed="rId3" cstate="print">
-            <a:extLst>
-              <a:ext uri="{28A0092B-C50C-407E-A947-70E740481C1C}">
-                <a14:useLocalDpi xmlns:a14="http://schemas.microsoft.com/office/drawing/2010/main" val="0"/>
-              </a:ext>
-            </a:extLst>
-          </a:blip>
-          <a:stretch>
-            <a:fillRect/>
-          </a:stretch>
-        </p:blipFill>
-        <p:spPr>
-          <a:xfrm>
-            <a:off x="4011027" y="3357849"/>
-            <a:ext cx="1151243" cy="1324925"/>
-          </a:xfrm>
-          <a:prstGeom prst="rect">
-            <a:avLst/>
-          </a:prstGeom>
-        </p:spPr>
-      </p:pic>
-    </p:spTree>
-    <p:extLst>
-      <p:ext uri="{BB962C8B-B14F-4D97-AF65-F5344CB8AC3E}">
-        <p14:creationId xmlns:p14="http://schemas.microsoft.com/office/powerpoint/2010/main" val="2768300375"/>
-      </p:ext>
-    </p:extLst>
-  </p:cSld>
-  <p:clrMapOvr>
-    <a:masterClrMapping/>
-  </p:clrMapOvr>
-  <p:transition spd="med"/>
-  <p:timing>
-    <p:tnLst>
-      <p:par>
-        <p:cTn id="1" dur="indefinite" restart="never" nodeType="tmRoot">
-          <p:childTnLst>
-            <p:seq concurrent="1" nextAc="seek">
-              <p:cTn id="2" dur="indefinite" nodeType="mainSeq">
-                <p:childTnLst>
-                  <p:par>
-                    <p:cTn id="3" fill="hold">
-                      <p:stCondLst>
-                        <p:cond delay="indefinite"/>
-                      </p:stCondLst>
-                      <p:childTnLst>
-                        <p:par>
-                          <p:cTn id="4" fill="hold">
-                            <p:stCondLst>
-                              <p:cond delay="0"/>
-                            </p:stCondLst>
-                            <p:childTnLst>
-                              <p:par>
-                                <p:cTn id="5" presetID="1" presetClass="entr" presetSubtype="0" fill="hold" grpId="0" nodeType="clickEffect">
-                                  <p:stCondLst>
-                                    <p:cond delay="0"/>
-                                  </p:stCondLst>
-                                  <p:childTnLst>
-                                    <p:set>
-                                      <p:cBhvr>
-                                        <p:cTn id="6" dur="1" fill="hold">
-                                          <p:stCondLst>
-                                            <p:cond delay="0"/>
-                                          </p:stCondLst>
-                                        </p:cTn>
-                                        <p:tgtEl>
-                                          <p:spTgt spid="6"/>
-                                        </p:tgtEl>
-                                        <p:attrNameLst>
-                                          <p:attrName>style.visibility</p:attrName>
-                                        </p:attrNameLst>
-                                      </p:cBhvr>
-                                      <p:to>
-                                        <p:strVal val="visible"/>
-                                      </p:to>
-                                    </p:set>
-                                  </p:childTnLst>
-                                </p:cTn>
-                              </p:par>
-                            </p:childTnLst>
-                          </p:cTn>
-                        </p:par>
-                      </p:childTnLst>
-                    </p:cTn>
-                  </p:par>
-                  <p:par>
-                    <p:cTn id="7" fill="hold">
-                      <p:stCondLst>
-                        <p:cond delay="indefinite"/>
-                      </p:stCondLst>
-                      <p:childTnLst>
-                        <p:par>
-                          <p:cTn id="8" fill="hold">
-                            <p:stCondLst>
-                              <p:cond delay="0"/>
-                            </p:stCondLst>
-                            <p:childTnLst>
-                              <p:par>
-                                <p:cTn id="9" presetID="1" presetClass="entr" presetSubtype="0" fill="hold" grpId="0" nodeType="clickEffect">
-                                  <p:stCondLst>
-                                    <p:cond delay="0"/>
-                                  </p:stCondLst>
-                                  <p:childTnLst>
-                                    <p:set>
-                                      <p:cBhvr>
-                                        <p:cTn id="10" dur="1" fill="hold">
-                                          <p:stCondLst>
-                                            <p:cond delay="0"/>
-                                          </p:stCondLst>
-                                        </p:cTn>
-                                        <p:tgtEl>
-                                          <p:spTgt spid="10"/>
-                                        </p:tgtEl>
-                                        <p:attrNameLst>
-                                          <p:attrName>style.visibility</p:attrName>
-                                        </p:attrNameLst>
-                                      </p:cBhvr>
-                                      <p:to>
-                                        <p:strVal val="visible"/>
-                                      </p:to>
-                                    </p:set>
-                                  </p:childTnLst>
-                                </p:cTn>
-                              </p:par>
-                            </p:childTnLst>
-                          </p:cTn>
-                        </p:par>
-                      </p:childTnLst>
-                    </p:cTn>
-                  </p:par>
-                  <p:par>
-                    <p:cTn id="11" fill="hold">
-                      <p:stCondLst>
-                        <p:cond delay="indefinite"/>
-                      </p:stCondLst>
-                      <p:childTnLst>
-                        <p:par>
-                          <p:cTn id="12" fill="hold">
-                            <p:stCondLst>
-                              <p:cond delay="0"/>
-                            </p:stCondLst>
-                            <p:childTnLst>
-                              <p:par>
-                                <p:cTn id="13" presetID="26" presetClass="entr" presetSubtype="0" fill="hold" nodeType="clickEffect">
-                                  <p:stCondLst>
-                                    <p:cond delay="0"/>
-                                  </p:stCondLst>
-                                  <p:childTnLst>
-                                    <p:set>
-                                      <p:cBhvr>
-                                        <p:cTn id="14" dur="1" fill="hold">
-                                          <p:stCondLst>
-                                            <p:cond delay="0"/>
-                                          </p:stCondLst>
-                                        </p:cTn>
-                                        <p:tgtEl>
-                                          <p:spTgt spid="7"/>
-                                        </p:tgtEl>
-                                        <p:attrNameLst>
-                                          <p:attrName>style.visibility</p:attrName>
-                                        </p:attrNameLst>
-                                      </p:cBhvr>
-                                      <p:to>
-                                        <p:strVal val="visible"/>
-                                      </p:to>
-                                    </p:set>
-                                    <p:animEffect transition="in" filter="wipe(down)">
-                                      <p:cBhvr>
-                                        <p:cTn id="15" dur="580">
-                                          <p:stCondLst>
-                                            <p:cond delay="0"/>
-                                          </p:stCondLst>
-                                        </p:cTn>
-                                        <p:tgtEl>
-                                          <p:spTgt spid="7"/>
-                                        </p:tgtEl>
-                                      </p:cBhvr>
-                                    </p:animEffect>
-                                    <p:anim calcmode="lin" valueType="num">
-                                      <p:cBhvr>
-                                        <p:cTn id="16" dur="1822" tmFilter="0,0; 0.14,0.36; 0.43,0.73; 0.71,0.91; 1.0,1.0">
-                                          <p:stCondLst>
-                                            <p:cond delay="0"/>
-                                          </p:stCondLst>
-                                        </p:cTn>
-                                        <p:tgtEl>
-                                          <p:spTgt spid="7"/>
-                                        </p:tgtEl>
-                                        <p:attrNameLst>
-                                          <p:attrName>ppt_x</p:attrName>
-                                        </p:attrNameLst>
-                                      </p:cBhvr>
-                                      <p:tavLst>
-                                        <p:tav tm="0">
-                                          <p:val>
-                                            <p:strVal val="#ppt_x-0.25"/>
-                                          </p:val>
-                                        </p:tav>
-                                        <p:tav tm="100000">
-                                          <p:val>
-                                            <p:strVal val="#ppt_x"/>
-                                          </p:val>
-                                        </p:tav>
-                                      </p:tavLst>
-                                    </p:anim>
-                                    <p:anim calcmode="lin" valueType="num">
-                                      <p:cBhvr>
-                                        <p:cTn id="17" dur="664" tmFilter="0.0,0.0; 0.25,0.07; 0.50,0.2; 0.75,0.467; 1.0,1.0">
-                                          <p:stCondLst>
-                                            <p:cond delay="0"/>
-                                          </p:stCondLst>
-                                        </p:cTn>
-                                        <p:tgtEl>
-                                          <p:spTgt spid="7"/>
-                                        </p:tgtEl>
-                                        <p:attrNameLst>
-                                          <p:attrName>ppt_y</p:attrName>
-                                        </p:attrNameLst>
-                                      </p:cBhvr>
-                                      <p:tavLst>
-                                        <p:tav tm="0" fmla="#ppt_y-sin(pi*$)/3">
-                                          <p:val>
-                                            <p:fltVal val="0.5"/>
-                                          </p:val>
-                                        </p:tav>
-                                        <p:tav tm="100000">
-                                          <p:val>
-                                            <p:fltVal val="1"/>
-                                          </p:val>
-                                        </p:tav>
-                                      </p:tavLst>
-                                    </p:anim>
-                                    <p:anim calcmode="lin" valueType="num">
-                                      <p:cBhvr>
-                                        <p:cTn id="18" dur="664" tmFilter="0, 0; 0.125,0.2665; 0.25,0.4; 0.375,0.465; 0.5,0.5;  0.625,0.535; 0.75,0.6; 0.875,0.7335; 1,1">
-                                          <p:stCondLst>
-                                            <p:cond delay="664"/>
-                                          </p:stCondLst>
-                                        </p:cTn>
-                                        <p:tgtEl>
-                                          <p:spTgt spid="7"/>
-                                        </p:tgtEl>
-                                        <p:attrNameLst>
-                                          <p:attrName>ppt_y</p:attrName>
-                                        </p:attrNameLst>
-                                      </p:cBhvr>
-                                      <p:tavLst>
-                                        <p:tav tm="0" fmla="#ppt_y-sin(pi*$)/9">
-                                          <p:val>
-                                            <p:fltVal val="0"/>
-                                          </p:val>
-                                        </p:tav>
-                                        <p:tav tm="100000">
-                                          <p:val>
-                                            <p:fltVal val="1"/>
-                                          </p:val>
-                                        </p:tav>
-                                      </p:tavLst>
-                                    </p:anim>
-                                    <p:anim calcmode="lin" valueType="num">
-                                      <p:cBhvr>
-                                        <p:cTn id="19" dur="332" tmFilter="0, 0; 0.125,0.2665; 0.25,0.4; 0.375,0.465; 0.5,0.5;  0.625,0.535; 0.75,0.6; 0.875,0.7335; 1,1">
-                                          <p:stCondLst>
-                                            <p:cond delay="1324"/>
-                                          </p:stCondLst>
-                                        </p:cTn>
-                                        <p:tgtEl>
-                                          <p:spTgt spid="7"/>
-                                        </p:tgtEl>
-                                        <p:attrNameLst>
-                                          <p:attrName>ppt_y</p:attrName>
-                                        </p:attrNameLst>
-                                      </p:cBhvr>
-                                      <p:tavLst>
-                                        <p:tav tm="0" fmla="#ppt_y-sin(pi*$)/27">
-                                          <p:val>
-                                            <p:fltVal val="0"/>
-                                          </p:val>
-                                        </p:tav>
-                                        <p:tav tm="100000">
-                                          <p:val>
-                                            <p:fltVal val="1"/>
-                                          </p:val>
-                                        </p:tav>
-                                      </p:tavLst>
-                                    </p:anim>
-                                    <p:anim calcmode="lin" valueType="num">
-                                      <p:cBhvr>
-                                        <p:cTn id="20" dur="164" tmFilter="0, 0; 0.125,0.2665; 0.25,0.4; 0.375,0.465; 0.5,0.5;  0.625,0.535; 0.75,0.6; 0.875,0.7335; 1,1">
-                                          <p:stCondLst>
-                                            <p:cond delay="1656"/>
-                                          </p:stCondLst>
-                                        </p:cTn>
-                                        <p:tgtEl>
-                                          <p:spTgt spid="7"/>
-                                        </p:tgtEl>
-                                        <p:attrNameLst>
-                                          <p:attrName>ppt_y</p:attrName>
-                                        </p:attrNameLst>
-                                      </p:cBhvr>
-                                      <p:tavLst>
-                                        <p:tav tm="0" fmla="#ppt_y-sin(pi*$)/81">
-                                          <p:val>
-                                            <p:fltVal val="0"/>
-                                          </p:val>
-                                        </p:tav>
-                                        <p:tav tm="100000">
-                                          <p:val>
-                                            <p:fltVal val="1"/>
-                                          </p:val>
-                                        </p:tav>
-                                      </p:tavLst>
-                                    </p:anim>
-                                    <p:animScale>
-                                      <p:cBhvr>
-                                        <p:cTn id="21" dur="26">
-                                          <p:stCondLst>
-                                            <p:cond delay="650"/>
-                                          </p:stCondLst>
-                                        </p:cTn>
-                                        <p:tgtEl>
-                                          <p:spTgt spid="7"/>
-                                        </p:tgtEl>
-                                      </p:cBhvr>
-                                      <p:to x="100000" y="60000"/>
-                                    </p:animScale>
-                                    <p:animScale>
-                                      <p:cBhvr>
-                                        <p:cTn id="22" dur="166" decel="50000">
-                                          <p:stCondLst>
-                                            <p:cond delay="676"/>
-                                          </p:stCondLst>
-                                        </p:cTn>
-                                        <p:tgtEl>
-                                          <p:spTgt spid="7"/>
-                                        </p:tgtEl>
-                                      </p:cBhvr>
-                                      <p:to x="100000" y="100000"/>
-                                    </p:animScale>
-                                    <p:animScale>
-                                      <p:cBhvr>
-                                        <p:cTn id="23" dur="26">
-                                          <p:stCondLst>
-                                            <p:cond delay="1312"/>
-                                          </p:stCondLst>
-                                        </p:cTn>
-                                        <p:tgtEl>
-                                          <p:spTgt spid="7"/>
-                                        </p:tgtEl>
-                                      </p:cBhvr>
-                                      <p:to x="100000" y="80000"/>
-                                    </p:animScale>
-                                    <p:animScale>
-                                      <p:cBhvr>
-                                        <p:cTn id="24" dur="166" decel="50000">
-                                          <p:stCondLst>
-                                            <p:cond delay="1338"/>
-                                          </p:stCondLst>
-                                        </p:cTn>
-                                        <p:tgtEl>
-                                          <p:spTgt spid="7"/>
-                                        </p:tgtEl>
-                                      </p:cBhvr>
-                                      <p:to x="100000" y="100000"/>
-                                    </p:animScale>
-                                    <p:animScale>
-                                      <p:cBhvr>
-                                        <p:cTn id="25" dur="26">
-                                          <p:stCondLst>
-                                            <p:cond delay="1642"/>
-                                          </p:stCondLst>
-                                        </p:cTn>
-                                        <p:tgtEl>
-                                          <p:spTgt spid="7"/>
-                                        </p:tgtEl>
-                                      </p:cBhvr>
-                                      <p:to x="100000" y="90000"/>
-                                    </p:animScale>
-                                    <p:animScale>
-                                      <p:cBhvr>
-                                        <p:cTn id="26" dur="166" decel="50000">
-                                          <p:stCondLst>
-                                            <p:cond delay="1668"/>
-                                          </p:stCondLst>
-                                        </p:cTn>
-                                        <p:tgtEl>
-                                          <p:spTgt spid="7"/>
-                                        </p:tgtEl>
-                                      </p:cBhvr>
-                                      <p:to x="100000" y="100000"/>
-                                    </p:animScale>
-                                    <p:animScale>
-                                      <p:cBhvr>
-                                        <p:cTn id="27" dur="26">
-                                          <p:stCondLst>
-                                            <p:cond delay="1808"/>
-                                          </p:stCondLst>
-                                        </p:cTn>
-                                        <p:tgtEl>
-                                          <p:spTgt spid="7"/>
-                                        </p:tgtEl>
-                                      </p:cBhvr>
-                                      <p:to x="100000" y="95000"/>
-                                    </p:animScale>
-                                    <p:animScale>
-                                      <p:cBhvr>
-                                        <p:cTn id="28" dur="166" decel="50000">
-                                          <p:stCondLst>
-                                            <p:cond delay="1834"/>
-                                          </p:stCondLst>
-                                        </p:cTn>
-                                        <p:tgtEl>
-                                          <p:spTgt spid="7"/>
-                                        </p:tgtEl>
-                                      </p:cBhvr>
-                                      <p:to x="100000" y="100000"/>
-                                    </p:animScale>
-                                  </p:childTnLst>
-                                </p:cTn>
-                              </p:par>
-                            </p:childTnLst>
-                          </p:cTn>
-                        </p:par>
-                      </p:childTnLst>
-                    </p:cTn>
-                  </p:par>
-                </p:childTnLst>
-              </p:cTn>
-              <p:prevCondLst>
-                <p:cond evt="onPrev" delay="0">
-                  <p:tgtEl>
-                    <p:sldTgt/>
-                  </p:tgtEl>
-                </p:cond>
-              </p:prevCondLst>
-              <p:nextCondLst>
-                <p:cond evt="onNext" delay="0">
-                  <p:tgtEl>
-                    <p:sldTgt/>
-                  </p:tgtEl>
-                </p:cond>
-              </p:nextCondLst>
-            </p:seq>
-          </p:childTnLst>
-        </p:cTn>
-      </p:par>
-    </p:tnLst>
-    <p:bldLst>
-      <p:bldP spid="6" grpId="0"/>
-      <p:bldP spid="10" grpId="0"/>
-    </p:bldLst>
-  </p:timing>
-</p:sld>
-</file>
-
-<file path=ppt/slides/slide11.xml><?xml version="1.0" encoding="utf-8"?>
 <p:sld xmlns:a="http://schemas.openxmlformats.org/drawingml/2006/main" xmlns:r="http://schemas.openxmlformats.org/officeDocument/2006/relationships" xmlns:p="http://schemas.openxmlformats.org/presentationml/2006/main">
   <p:cSld>
     <p:spTree>
@@ -5709,7 +4871,7 @@
             <a:effectLst/>
             <a:extLst>
               <a:ext uri="{C572A759-6A51-4108-AA02-DFA0A04FC94B}">
-                <ma14:wrappingTextBoxFlag xmlns:ma14="http://schemas.microsoft.com/office/mac/drawingml/2011/main" xmlns="" val="1"/>
+                <ma14:wrappingTextBoxFlag xmlns="" xmlns:ma14="http://schemas.microsoft.com/office/mac/drawingml/2011/main" val="1"/>
               </a:ext>
             </a:extLst>
           </p:spPr>
@@ -5904,7 +5066,7 @@
             <a:effectLst/>
             <a:extLst>
               <a:ext uri="{C572A759-6A51-4108-AA02-DFA0A04FC94B}">
-                <ma14:wrappingTextBoxFlag xmlns:ma14="http://schemas.microsoft.com/office/mac/drawingml/2011/main" xmlns="" val="1"/>
+                <ma14:wrappingTextBoxFlag xmlns="" xmlns:ma14="http://schemas.microsoft.com/office/mac/drawingml/2011/main" val="1"/>
               </a:ext>
             </a:extLst>
           </p:spPr>
@@ -5965,7 +5127,7 @@
             <a:pPr lvl="0"/>
             <a:fld id="{86CB4B4D-7CA3-9044-876B-883B54F8677D}" type="slidenum">
               <a:rPr lang="en-US" smtClean="0"/>
-              <a:t>11</a:t>
+              <a:t>10</a:t>
             </a:fld>
             <a:endParaRPr lang="en-US"/>
           </a:p>
@@ -5980,7 +5142,7 @@
 </p:sld>
 </file>
 
-<file path=ppt/slides/slide12.xml><?xml version="1.0" encoding="utf-8"?>
+<file path=ppt/slides/slide11.xml><?xml version="1.0" encoding="utf-8"?>
 <p:sld xmlns:a="http://schemas.openxmlformats.org/drawingml/2006/main" xmlns:r="http://schemas.openxmlformats.org/officeDocument/2006/relationships" xmlns:p="http://schemas.openxmlformats.org/presentationml/2006/main">
   <p:cSld>
     <p:spTree>
@@ -6776,7 +5938,7 @@
             <a:pPr lvl="0"/>
             <a:fld id="{86CB4B4D-7CA3-9044-876B-883B54F8677D}" type="slidenum">
               <a:rPr lang="en-US" smtClean="0"/>
-              <a:t>12</a:t>
+              <a:t>11</a:t>
             </a:fld>
             <a:endParaRPr lang="en-US"/>
           </a:p>
@@ -11075,7 +10237,7 @@
               <a:t>  </a:t>
             </a:r>
             <a:r>
-              <a:rPr sz="2400" i="1" dirty="0" err="1">
+              <a:rPr lang="en-US" sz="2400" i="1" dirty="0" err="1">
                 <a:solidFill>
                   <a:schemeClr val="tx1"/>
                 </a:solidFill>
@@ -11084,7 +10246,7 @@
                 <a:cs typeface="Courier New" panose="02070309020205020404" pitchFamily="49" charset="0"/>
                 <a:sym typeface="Consolas"/>
               </a:rPr>
-              <a:t>ElementType</a:t>
+              <a:t>elementType</a:t>
             </a:r>
             <a:r>
               <a:rPr sz="2400" dirty="0">
@@ -11394,88 +10556,6 @@
               <a:latin typeface="Courier New" panose="02070309020205020404" pitchFamily="49" charset="0"/>
               <a:cs typeface="Courier New" panose="02070309020205020404" pitchFamily="49" charset="0"/>
             </a:endParaRPr>
-          </a:p>
-          <a:p>
-            <a:pPr marL="742950" lvl="1" indent="-285750">
-              <a:spcBef>
-                <a:spcPts val="600"/>
-              </a:spcBef>
-              <a:buFont typeface="Verdana"/>
-              <a:buChar char="◦"/>
-              <a:defRPr sz="1800"/>
-            </a:pPr>
-            <a:r>
-              <a:rPr sz="2000" dirty="0">
-                <a:latin typeface="Times New Roman" panose="02020603050405020304" pitchFamily="18" charset="0"/>
-                <a:cs typeface="Times New Roman" panose="02020603050405020304" pitchFamily="18" charset="0"/>
-              </a:rPr>
-              <a:t>A field</a:t>
-            </a:r>
-            <a:r>
-              <a:rPr lang="en-US" sz="2000" dirty="0">
-                <a:latin typeface="Times New Roman" panose="02020603050405020304" pitchFamily="18" charset="0"/>
-                <a:cs typeface="Times New Roman" panose="02020603050405020304" pitchFamily="18" charset="0"/>
-              </a:rPr>
-              <a:t> inside a class</a:t>
-            </a:r>
-            <a:r>
-              <a:rPr sz="2000" dirty="0">
-                <a:latin typeface="Times New Roman" panose="02020603050405020304" pitchFamily="18" charset="0"/>
-                <a:cs typeface="Times New Roman" panose="02020603050405020304" pitchFamily="18" charset="0"/>
-              </a:rPr>
-              <a:t>:</a:t>
-            </a:r>
-            <a:br>
-              <a:rPr lang="en-US" sz="2500" dirty="0"/>
-            </a:br>
-            <a:r>
-              <a:rPr sz="2000" b="1" dirty="0">
-                <a:solidFill>
-                  <a:schemeClr val="tx1"/>
-                </a:solidFill>
-                <a:latin typeface="Courier New" panose="02070309020205020404" pitchFamily="49" charset="0"/>
-                <a:ea typeface="Consolas"/>
-                <a:cs typeface="Courier New" panose="02070309020205020404" pitchFamily="49" charset="0"/>
-                <a:sym typeface="Consolas"/>
-              </a:rPr>
-              <a:t>private </a:t>
-            </a:r>
-            <a:r>
-              <a:rPr sz="2000" dirty="0">
-                <a:solidFill>
-                  <a:schemeClr val="tx1"/>
-                </a:solidFill>
-                <a:latin typeface="Courier New" panose="02070309020205020404" pitchFamily="49" charset="0"/>
-                <a:ea typeface="Consolas"/>
-                <a:cs typeface="Courier New" panose="02070309020205020404" pitchFamily="49" charset="0"/>
-                <a:sym typeface="Consolas"/>
-              </a:rPr>
-              <a:t>Investment[] </a:t>
-            </a:r>
-            <a:r>
-              <a:rPr sz="2000" dirty="0" err="1">
-                <a:solidFill>
-                  <a:schemeClr val="tx1"/>
-                </a:solidFill>
-                <a:latin typeface="Courier New" panose="02070309020205020404" pitchFamily="49" charset="0"/>
-                <a:ea typeface="Consolas"/>
-                <a:cs typeface="Courier New" panose="02070309020205020404" pitchFamily="49" charset="0"/>
-                <a:sym typeface="Consolas"/>
-              </a:rPr>
-              <a:t>mutualFunds</a:t>
-            </a:r>
-            <a:r>
-              <a:rPr sz="2000" dirty="0">
-                <a:solidFill>
-                  <a:schemeClr val="tx1"/>
-                </a:solidFill>
-                <a:latin typeface="Courier New" panose="02070309020205020404" pitchFamily="49" charset="0"/>
-                <a:ea typeface="Consolas"/>
-                <a:cs typeface="Courier New" panose="02070309020205020404" pitchFamily="49" charset="0"/>
-                <a:sym typeface="Consolas"/>
-              </a:rPr>
-              <a:t>;</a:t>
-            </a:r>
           </a:p>
         </p:txBody>
       </p:sp>
@@ -11660,7 +10740,7 @@
               <a:t> </a:t>
             </a:r>
             <a:r>
-              <a:rPr sz="2000" i="1" dirty="0" err="1">
+              <a:rPr lang="en-US" sz="2000" i="1" dirty="0" err="1">
                 <a:solidFill>
                   <a:schemeClr val="tx1"/>
                 </a:solidFill>
@@ -11669,7 +10749,7 @@
                 <a:cs typeface="Courier New" panose="02070309020205020404" pitchFamily="49" charset="0"/>
                 <a:sym typeface="Consolas"/>
               </a:rPr>
-              <a:t>ElementType</a:t>
+              <a:t>elementType</a:t>
             </a:r>
             <a:r>
               <a:rPr sz="2000" dirty="0">
@@ -11992,81 +11072,6 @@
               <a:latin typeface="Courier New" panose="02070309020205020404" pitchFamily="49" charset="0"/>
               <a:cs typeface="Courier New" panose="02070309020205020404" pitchFamily="49" charset="0"/>
             </a:endParaRPr>
-          </a:p>
-          <a:p>
-            <a:pPr marL="457200" lvl="1" indent="0">
-              <a:lnSpc>
-                <a:spcPct val="80000"/>
-              </a:lnSpc>
-              <a:spcBef>
-                <a:spcPts val="500"/>
-              </a:spcBef>
-              <a:buClr>
-                <a:srgbClr val="9BBB59"/>
-              </a:buClr>
-              <a:buNone/>
-              <a:defRPr sz="1800"/>
-            </a:pPr>
-            <a:r>
-              <a:rPr sz="2000" dirty="0">
-                <a:solidFill>
-                  <a:schemeClr val="tx1"/>
-                </a:solidFill>
-                <a:latin typeface="Courier New" panose="02070309020205020404" pitchFamily="49" charset="0"/>
-                <a:ea typeface="Consolas"/>
-                <a:cs typeface="Courier New" panose="02070309020205020404" pitchFamily="49" charset="0"/>
-                <a:sym typeface="Consolas"/>
-              </a:rPr>
-              <a:t>Dog[] dogs = </a:t>
-            </a:r>
-            <a:r>
-              <a:rPr sz="2000" b="1" dirty="0">
-                <a:solidFill>
-                  <a:schemeClr val="tx1"/>
-                </a:solidFill>
-                <a:latin typeface="Courier New" panose="02070309020205020404" pitchFamily="49" charset="0"/>
-                <a:ea typeface="Consolas"/>
-                <a:cs typeface="Courier New" panose="02070309020205020404" pitchFamily="49" charset="0"/>
-                <a:sym typeface="Consolas"/>
-              </a:rPr>
-              <a:t>new</a:t>
-            </a:r>
-            <a:r>
-              <a:rPr sz="2000" dirty="0">
-                <a:solidFill>
-                  <a:schemeClr val="tx1"/>
-                </a:solidFill>
-                <a:latin typeface="Courier New" panose="02070309020205020404" pitchFamily="49" charset="0"/>
-                <a:ea typeface="Consolas"/>
-                <a:cs typeface="Courier New" panose="02070309020205020404" pitchFamily="49" charset="0"/>
-                <a:sym typeface="Consolas"/>
-              </a:rPr>
-              <a:t> Dog[</a:t>
-            </a:r>
-            <a:r>
-              <a:rPr lang="en-US" sz="2000" dirty="0">
-                <a:solidFill>
-                  <a:schemeClr val="tx1"/>
-                </a:solidFill>
-                <a:latin typeface="Courier New" panose="02070309020205020404" pitchFamily="49" charset="0"/>
-                <a:ea typeface="Consolas"/>
-                <a:cs typeface="Courier New" panose="02070309020205020404" pitchFamily="49" charset="0"/>
-                <a:sym typeface="Consolas"/>
-              </a:rPr>
-              <a:t>1</a:t>
-            </a:r>
-            <a:r>
-              <a:rPr sz="2000" dirty="0">
-                <a:solidFill>
-                  <a:schemeClr val="tx1"/>
-                </a:solidFill>
-                <a:latin typeface="Courier New" panose="02070309020205020404" pitchFamily="49" charset="0"/>
-                <a:ea typeface="Consolas"/>
-                <a:cs typeface="Courier New" panose="02070309020205020404" pitchFamily="49" charset="0"/>
-                <a:sym typeface="Consolas"/>
-              </a:rPr>
-              <a:t>0];</a:t>
-            </a:r>
           </a:p>
         </p:txBody>
       </p:sp>
@@ -12323,26 +11328,6 @@
               <a:defRPr sz="1800"/>
             </a:pPr>
             <a:r>
-              <a:rPr lang="en-US" sz="2000" b="1" dirty="0">
-                <a:solidFill>
-                  <a:schemeClr val="tx1"/>
-                </a:solidFill>
-                <a:latin typeface="Courier New" panose="02070309020205020404" pitchFamily="49" charset="0"/>
-                <a:ea typeface="Consolas"/>
-                <a:cs typeface="Courier New" panose="02070309020205020404" pitchFamily="49" charset="0"/>
-                <a:sym typeface="Consolas"/>
-              </a:rPr>
-              <a:t>null</a:t>
-            </a:r>
-            <a:r>
-              <a:rPr lang="en-US" sz="2300" dirty="0">
-                <a:solidFill>
-                  <a:schemeClr val="tx1"/>
-                </a:solidFill>
-              </a:rPr>
-              <a:t> </a:t>
-            </a:r>
-            <a:r>
               <a:rPr lang="en-US" sz="2000" dirty="0">
                 <a:solidFill>
                   <a:schemeClr val="tx1"/>
@@ -12350,8 +11335,27 @@
                 <a:latin typeface="Times New Roman" panose="02020603050405020304" pitchFamily="18" charset="0"/>
                 <a:cs typeface="Times New Roman" panose="02020603050405020304" pitchFamily="18" charset="0"/>
               </a:rPr>
-              <a:t>	for object types</a:t>
-            </a:r>
+              <a:t>null	for non-primitives (including arrays)</a:t>
+            </a:r>
+          </a:p>
+          <a:p>
+            <a:pPr marL="457200" lvl="1" indent="0">
+              <a:lnSpc>
+                <a:spcPct val="80000"/>
+              </a:lnSpc>
+              <a:spcBef>
+                <a:spcPts val="600"/>
+              </a:spcBef>
+              <a:buNone/>
+              <a:defRPr sz="1800"/>
+            </a:pPr>
+            <a:endParaRPr lang="en-US" sz="2000" dirty="0">
+              <a:solidFill>
+                <a:schemeClr val="tx1"/>
+              </a:solidFill>
+              <a:latin typeface="Times New Roman" panose="02020603050405020304" pitchFamily="18" charset="0"/>
+              <a:cs typeface="Times New Roman" panose="02020603050405020304" pitchFamily="18" charset="0"/>
+            </a:endParaRPr>
           </a:p>
           <a:p>
             <a:pPr>
@@ -12550,42 +11554,6 @@
               <a:defRPr sz="1800"/>
             </a:pPr>
             <a:r>
-              <a:rPr sz="1600" dirty="0">
-                <a:solidFill>
-                  <a:schemeClr val="tx1"/>
-                </a:solidFill>
-                <a:latin typeface="Courier New" panose="02070309020205020404" pitchFamily="49" charset="0"/>
-                <a:ea typeface="Consolas"/>
-                <a:cs typeface="Courier New" panose="02070309020205020404" pitchFamily="49" charset="0"/>
-                <a:sym typeface="Consolas"/>
-              </a:rPr>
-              <a:t>Dog[] dogs = </a:t>
-            </a:r>
-            <a:r>
-              <a:rPr sz="1600" b="1" dirty="0">
-                <a:solidFill>
-                  <a:schemeClr val="tx1"/>
-                </a:solidFill>
-                <a:latin typeface="Courier New" panose="02070309020205020404" pitchFamily="49" charset="0"/>
-                <a:ea typeface="Consolas"/>
-                <a:cs typeface="Courier New" panose="02070309020205020404" pitchFamily="49" charset="0"/>
-                <a:sym typeface="Consolas"/>
-              </a:rPr>
-              <a:t>new</a:t>
-            </a:r>
-            <a:r>
-              <a:rPr sz="1600" dirty="0">
-                <a:solidFill>
-                  <a:schemeClr val="tx1"/>
-                </a:solidFill>
-                <a:latin typeface="Courier New" panose="02070309020205020404" pitchFamily="49" charset="0"/>
-                <a:ea typeface="Consolas"/>
-                <a:cs typeface="Courier New" panose="02070309020205020404" pitchFamily="49" charset="0"/>
-                <a:sym typeface="Consolas"/>
-              </a:rPr>
-              <a:t> Dog[</a:t>
-            </a:r>
-            <a:r>
               <a:rPr lang="en-US" sz="1600" dirty="0">
                 <a:solidFill>
                   <a:schemeClr val="tx1"/>
@@ -12595,29 +11563,8 @@
                 <a:cs typeface="Courier New" panose="02070309020205020404" pitchFamily="49" charset="0"/>
                 <a:sym typeface="Consolas"/>
               </a:rPr>
-              <a:t>1</a:t>
-            </a:r>
-            <a:r>
-              <a:rPr sz="1600" dirty="0">
-                <a:solidFill>
-                  <a:schemeClr val="tx1"/>
-                </a:solidFill>
-                <a:latin typeface="Courier New" panose="02070309020205020404" pitchFamily="49" charset="0"/>
-                <a:ea typeface="Consolas"/>
-                <a:cs typeface="Courier New" panose="02070309020205020404" pitchFamily="49" charset="0"/>
-                <a:sym typeface="Consolas"/>
-              </a:rPr>
-              <a:t>0];</a:t>
-            </a:r>
-            <a:endParaRPr lang="en-US" sz="1600" dirty="0">
-              <a:solidFill>
-                <a:schemeClr val="tx1"/>
-              </a:solidFill>
-              <a:latin typeface="Courier New" panose="02070309020205020404" pitchFamily="49" charset="0"/>
-              <a:ea typeface="Consolas"/>
-              <a:cs typeface="Courier New" panose="02070309020205020404" pitchFamily="49" charset="0"/>
-              <a:sym typeface="Consolas"/>
-            </a:endParaRPr>
+              <a:t> </a:t>
+            </a:r>
           </a:p>
           <a:p>
             <a:pPr marL="457200" lvl="1" indent="0">
@@ -12760,42 +11707,6 @@
               <a:sym typeface="Consolas"/>
             </a:endParaRPr>
           </a:p>
-          <a:p>
-            <a:pPr marL="457200" lvl="1" indent="0">
-              <a:lnSpc>
-                <a:spcPct val="80000"/>
-              </a:lnSpc>
-              <a:spcBef>
-                <a:spcPts val="500"/>
-              </a:spcBef>
-              <a:buClr>
-                <a:srgbClr val="9BBB59"/>
-              </a:buClr>
-              <a:buNone/>
-              <a:defRPr sz="1800"/>
-            </a:pPr>
-            <a:r>
-              <a:rPr lang="en-US" sz="1600" dirty="0">
-                <a:solidFill>
-                  <a:schemeClr val="tx1"/>
-                </a:solidFill>
-                <a:latin typeface="Courier New" panose="02070309020205020404" pitchFamily="49" charset="0"/>
-                <a:ea typeface="Consolas"/>
-                <a:cs typeface="Courier New" panose="02070309020205020404" pitchFamily="49" charset="0"/>
-                <a:sym typeface="Consolas"/>
-              </a:rPr>
-              <a:t>dogs</a:t>
-            </a:r>
-            <a:endParaRPr sz="1600" dirty="0">
-              <a:solidFill>
-                <a:schemeClr val="tx1"/>
-              </a:solidFill>
-              <a:latin typeface="Courier New" panose="02070309020205020404" pitchFamily="49" charset="0"/>
-              <a:ea typeface="Consolas"/>
-              <a:cs typeface="Courier New" panose="02070309020205020404" pitchFamily="49" charset="0"/>
-              <a:sym typeface="Consolas"/>
-            </a:endParaRPr>
-          </a:p>
         </p:txBody>
       </p:sp>
       <p:sp>
@@ -12842,7 +11753,7 @@
         </p:nvSpPr>
         <p:spPr>
           <a:xfrm>
-            <a:off x="1447798" y="4512733"/>
+            <a:off x="1477433" y="4389967"/>
             <a:ext cx="228600" cy="228600"/>
           </a:xfrm>
           <a:prstGeom prst="rect">
@@ -12930,93 +11841,6 @@
         <p:spPr>
           <a:xfrm>
             <a:off x="2815164" y="4741333"/>
-            <a:ext cx="228600" cy="228600"/>
-          </a:xfrm>
-          <a:prstGeom prst="rect">
-            <a:avLst/>
-          </a:prstGeom>
-          <a:noFill/>
-          <a:ln w="25400" cap="flat">
-            <a:solidFill>
-              <a:schemeClr val="tx1"/>
-            </a:solidFill>
-            <a:prstDash val="solid"/>
-            <a:bevel/>
-          </a:ln>
-          <a:effectLst>
-            <a:outerShdw blurRad="38100" dist="23000" dir="5400000" rotWithShape="0">
-              <a:srgbClr val="000000">
-                <a:alpha val="35000"/>
-              </a:srgbClr>
-            </a:outerShdw>
-          </a:effectLst>
-        </p:spPr>
-        <p:style>
-          <a:lnRef idx="0">
-            <a:scrgbClr r="0" g="0" b="0"/>
-          </a:lnRef>
-          <a:fillRef idx="0">
-            <a:scrgbClr r="0" g="0" b="0"/>
-          </a:fillRef>
-          <a:effectRef idx="0">
-            <a:scrgbClr r="0" g="0" b="0"/>
-          </a:effectRef>
-          <a:fontRef idx="none"/>
-        </p:style>
-        <p:txBody>
-          <a:bodyPr rot="0" spcFirstLastPara="1" vertOverflow="overflow" horzOverflow="overflow" vert="horz" wrap="square" lIns="45719" tIns="45719" rIns="45719" bIns="45719" numCol="1" spcCol="38100" rtlCol="0" anchor="ctr">
-            <a:spAutoFit/>
-          </a:bodyPr>
-          <a:lstStyle/>
-          <a:p>
-            <a:pPr marL="0" marR="0" indent="0" algn="l" defTabSz="914400" rtl="0" fontAlgn="auto" latinLnBrk="1" hangingPunct="0">
-              <a:lnSpc>
-                <a:spcPct val="100000"/>
-              </a:lnSpc>
-              <a:spcBef>
-                <a:spcPts val="0"/>
-              </a:spcBef>
-              <a:spcAft>
-                <a:spcPts val="0"/>
-              </a:spcAft>
-              <a:buClrTx/>
-              <a:buSzTx/>
-              <a:buFontTx/>
-              <a:buNone/>
-              <a:tabLst/>
-            </a:pPr>
-            <a:endParaRPr kumimoji="0" lang="en-US" sz="1800" b="0" i="0" u="none" strike="noStrike" cap="none" spc="0" normalizeH="0" baseline="0">
-              <a:ln>
-                <a:noFill/>
-              </a:ln>
-              <a:solidFill>
-                <a:srgbClr val="000000"/>
-              </a:solidFill>
-              <a:effectLst/>
-              <a:uFillTx/>
-              <a:latin typeface="Calibri"/>
-              <a:ea typeface="Calibri"/>
-              <a:cs typeface="Calibri"/>
-              <a:sym typeface="Calibri"/>
-            </a:endParaRPr>
-          </a:p>
-        </p:txBody>
-      </p:sp>
-      <p:sp>
-        <p:nvSpPr>
-          <p:cNvPr id="7" name="Rectangle 6">
-            <a:extLst>
-              <a:ext uri="{FF2B5EF4-FFF2-40B4-BE49-F238E27FC236}">
-                <a16:creationId xmlns:a16="http://schemas.microsoft.com/office/drawing/2014/main" id="{4D5481AE-4C46-7B4C-AC3C-C12D001CE122}"/>
-              </a:ext>
-            </a:extLst>
-          </p:cNvPr>
-          <p:cNvSpPr/>
-          <p:nvPr/>
-        </p:nvSpPr>
-        <p:spPr>
-          <a:xfrm>
-            <a:off x="1286934" y="5031317"/>
             <a:ext cx="228600" cy="228600"/>
           </a:xfrm>
           <a:prstGeom prst="rect">
@@ -13237,229 +12061,6 @@
           </a:graphicData>
         </a:graphic>
       </p:graphicFrame>
-      <p:graphicFrame>
-        <p:nvGraphicFramePr>
-          <p:cNvPr id="10" name="Table 6">
-            <a:extLst>
-              <a:ext uri="{FF2B5EF4-FFF2-40B4-BE49-F238E27FC236}">
-                <a16:creationId xmlns:a16="http://schemas.microsoft.com/office/drawing/2014/main" id="{B78FCB2A-BC75-D34D-959A-9B687ACAE719}"/>
-              </a:ext>
-            </a:extLst>
-          </p:cNvPr>
-          <p:cNvGraphicFramePr>
-            <a:graphicFrameLocks noGrp="1"/>
-          </p:cNvGraphicFramePr>
-          <p:nvPr>
-            <p:extLst>
-              <p:ext uri="{D42A27DB-BD31-4B8C-83A1-F6EECF244321}">
-                <p14:modId xmlns:p14="http://schemas.microsoft.com/office/powerpoint/2010/main" val="1012507129"/>
-              </p:ext>
-            </p:extLst>
-          </p:nvPr>
-        </p:nvGraphicFramePr>
-        <p:xfrm>
-          <a:off x="3826934" y="5155777"/>
-          <a:ext cx="4030130" cy="365760"/>
-        </p:xfrm>
-        <a:graphic>
-          <a:graphicData uri="http://schemas.openxmlformats.org/drawingml/2006/table">
-            <a:tbl>
-              <a:tblPr firstRow="1" bandRow="1">
-                <a:tableStyleId>{5940675A-B579-460E-94D1-54222C63F5DA}</a:tableStyleId>
-              </a:tblPr>
-              <a:tblGrid>
-                <a:gridCol w="403013">
-                  <a:extLst>
-                    <a:ext uri="{9D8B030D-6E8A-4147-A177-3AD203B41FA5}">
-                      <a16:colId xmlns:a16="http://schemas.microsoft.com/office/drawing/2014/main" val="2963928598"/>
-                    </a:ext>
-                  </a:extLst>
-                </a:gridCol>
-                <a:gridCol w="403013">
-                  <a:extLst>
-                    <a:ext uri="{9D8B030D-6E8A-4147-A177-3AD203B41FA5}">
-                      <a16:colId xmlns:a16="http://schemas.microsoft.com/office/drawing/2014/main" val="4286317162"/>
-                    </a:ext>
-                  </a:extLst>
-                </a:gridCol>
-                <a:gridCol w="403013">
-                  <a:extLst>
-                    <a:ext uri="{9D8B030D-6E8A-4147-A177-3AD203B41FA5}">
-                      <a16:colId xmlns:a16="http://schemas.microsoft.com/office/drawing/2014/main" val="3659483150"/>
-                    </a:ext>
-                  </a:extLst>
-                </a:gridCol>
-                <a:gridCol w="403013">
-                  <a:extLst>
-                    <a:ext uri="{9D8B030D-6E8A-4147-A177-3AD203B41FA5}">
-                      <a16:colId xmlns:a16="http://schemas.microsoft.com/office/drawing/2014/main" val="2283203137"/>
-                    </a:ext>
-                  </a:extLst>
-                </a:gridCol>
-                <a:gridCol w="403013">
-                  <a:extLst>
-                    <a:ext uri="{9D8B030D-6E8A-4147-A177-3AD203B41FA5}">
-                      <a16:colId xmlns:a16="http://schemas.microsoft.com/office/drawing/2014/main" val="1621494519"/>
-                    </a:ext>
-                  </a:extLst>
-                </a:gridCol>
-                <a:gridCol w="403013">
-                  <a:extLst>
-                    <a:ext uri="{9D8B030D-6E8A-4147-A177-3AD203B41FA5}">
-                      <a16:colId xmlns:a16="http://schemas.microsoft.com/office/drawing/2014/main" val="501374355"/>
-                    </a:ext>
-                  </a:extLst>
-                </a:gridCol>
-                <a:gridCol w="403013">
-                  <a:extLst>
-                    <a:ext uri="{9D8B030D-6E8A-4147-A177-3AD203B41FA5}">
-                      <a16:colId xmlns:a16="http://schemas.microsoft.com/office/drawing/2014/main" val="4048515096"/>
-                    </a:ext>
-                  </a:extLst>
-                </a:gridCol>
-                <a:gridCol w="403013">
-                  <a:extLst>
-                    <a:ext uri="{9D8B030D-6E8A-4147-A177-3AD203B41FA5}">
-                      <a16:colId xmlns:a16="http://schemas.microsoft.com/office/drawing/2014/main" val="749521950"/>
-                    </a:ext>
-                  </a:extLst>
-                </a:gridCol>
-                <a:gridCol w="403013">
-                  <a:extLst>
-                    <a:ext uri="{9D8B030D-6E8A-4147-A177-3AD203B41FA5}">
-                      <a16:colId xmlns:a16="http://schemas.microsoft.com/office/drawing/2014/main" val="4212652465"/>
-                    </a:ext>
-                  </a:extLst>
-                </a:gridCol>
-                <a:gridCol w="403013">
-                  <a:extLst>
-                    <a:ext uri="{9D8B030D-6E8A-4147-A177-3AD203B41FA5}">
-                      <a16:colId xmlns:a16="http://schemas.microsoft.com/office/drawing/2014/main" val="791707815"/>
-                    </a:ext>
-                  </a:extLst>
-                </a:gridCol>
-              </a:tblGrid>
-              <a:tr h="290040">
-                <a:tc>
-                  <a:txBody>
-                    <a:bodyPr/>
-                    <a:lstStyle/>
-                    <a:p>
-                      <a:pPr algn="ctr"/>
-                      <a:endParaRPr lang="en-US" sz="1800" dirty="0"/>
-                    </a:p>
-                  </a:txBody>
-                  <a:tcPr/>
-                </a:tc>
-                <a:tc>
-                  <a:txBody>
-                    <a:bodyPr/>
-                    <a:lstStyle/>
-                    <a:p>
-                      <a:pPr algn="ctr"/>
-                      <a:endParaRPr lang="en-US" sz="1800" dirty="0"/>
-                    </a:p>
-                  </a:txBody>
-                  <a:tcPr/>
-                </a:tc>
-                <a:tc>
-                  <a:txBody>
-                    <a:bodyPr/>
-                    <a:lstStyle/>
-                    <a:p>
-                      <a:pPr algn="ctr"/>
-                      <a:endParaRPr lang="en-US" sz="1800" dirty="0"/>
-                    </a:p>
-                  </a:txBody>
-                  <a:tcPr/>
-                </a:tc>
-                <a:tc>
-                  <a:txBody>
-                    <a:bodyPr/>
-                    <a:lstStyle/>
-                    <a:p>
-                      <a:pPr algn="ctr"/>
-                      <a:endParaRPr lang="en-US" sz="1800" dirty="0"/>
-                    </a:p>
-                  </a:txBody>
-                  <a:tcPr/>
-                </a:tc>
-                <a:tc>
-                  <a:txBody>
-                    <a:bodyPr/>
-                    <a:lstStyle/>
-                    <a:p>
-                      <a:pPr algn="ctr"/>
-                      <a:endParaRPr lang="en-US" sz="1800" dirty="0"/>
-                    </a:p>
-                  </a:txBody>
-                  <a:tcPr/>
-                </a:tc>
-                <a:tc>
-                  <a:txBody>
-                    <a:bodyPr/>
-                    <a:lstStyle/>
-                    <a:p>
-                      <a:pPr algn="ctr"/>
-                      <a:endParaRPr lang="en-US" sz="1800" dirty="0"/>
-                    </a:p>
-                  </a:txBody>
-                  <a:tcPr/>
-                </a:tc>
-                <a:tc>
-                  <a:txBody>
-                    <a:bodyPr/>
-                    <a:lstStyle/>
-                    <a:p>
-                      <a:pPr algn="ctr"/>
-                      <a:endParaRPr lang="en-US" sz="1800" dirty="0"/>
-                    </a:p>
-                  </a:txBody>
-                  <a:tcPr/>
-                </a:tc>
-                <a:tc>
-                  <a:txBody>
-                    <a:bodyPr/>
-                    <a:lstStyle/>
-                    <a:p>
-                      <a:pPr algn="ctr"/>
-                      <a:endParaRPr lang="en-US" sz="1800" dirty="0"/>
-                    </a:p>
-                  </a:txBody>
-                  <a:tcPr/>
-                </a:tc>
-                <a:tc>
-                  <a:txBody>
-                    <a:bodyPr/>
-                    <a:lstStyle/>
-                    <a:p>
-                      <a:pPr algn="ctr"/>
-                      <a:endParaRPr lang="en-US" sz="1800" dirty="0"/>
-                    </a:p>
-                  </a:txBody>
-                  <a:tcPr/>
-                </a:tc>
-                <a:tc>
-                  <a:txBody>
-                    <a:bodyPr/>
-                    <a:lstStyle/>
-                    <a:p>
-                      <a:pPr algn="ctr"/>
-                      <a:endParaRPr lang="en-US" sz="1800" dirty="0"/>
-                    </a:p>
-                  </a:txBody>
-                  <a:tcPr/>
-                </a:tc>
-                <a:extLst>
-                  <a:ext uri="{0D108BD9-81ED-4DB2-BD59-A6C34878D82A}">
-                    <a16:rowId xmlns:a16="http://schemas.microsoft.com/office/drawing/2014/main" val="3630924901"/>
-                  </a:ext>
-                </a:extLst>
-              </a:tr>
-            </a:tbl>
-          </a:graphicData>
-        </a:graphic>
-      </p:graphicFrame>
       <p:cxnSp>
         <p:nvCxnSpPr>
           <p:cNvPr id="5" name="Straight Arrow Connector 4">
@@ -13477,7 +12078,7 @@
         <p:spPr>
           <a:xfrm flipV="1">
             <a:off x="1591733" y="4377267"/>
-            <a:ext cx="2175934" cy="254000"/>
+            <a:ext cx="2175934" cy="127000"/>
           </a:xfrm>
           <a:prstGeom prst="straightConnector1">
             <a:avLst/>
@@ -13565,1219 +12166,6 @@
           <a:fontRef idx="none"/>
         </p:style>
       </p:cxnSp>
-      <p:cxnSp>
-        <p:nvCxnSpPr>
-          <p:cNvPr id="15" name="Straight Arrow Connector 14">
-            <a:extLst>
-              <a:ext uri="{FF2B5EF4-FFF2-40B4-BE49-F238E27FC236}">
-                <a16:creationId xmlns:a16="http://schemas.microsoft.com/office/drawing/2014/main" id="{247F1FF4-F017-7A46-8509-23AFEFF78059}"/>
-              </a:ext>
-            </a:extLst>
-          </p:cNvPr>
-          <p:cNvCxnSpPr>
-            <a:cxnSpLocks/>
-            <a:endCxn id="10" idx="1"/>
-          </p:cNvCxnSpPr>
-          <p:nvPr/>
-        </p:nvCxnSpPr>
-        <p:spPr>
-          <a:xfrm>
-            <a:off x="1380066" y="5155777"/>
-            <a:ext cx="2446868" cy="182880"/>
-          </a:xfrm>
-          <a:prstGeom prst="straightConnector1">
-            <a:avLst/>
-          </a:prstGeom>
-          <a:noFill/>
-          <a:ln w="25400" cap="flat">
-            <a:solidFill>
-              <a:schemeClr val="tx1"/>
-            </a:solidFill>
-            <a:prstDash val="solid"/>
-            <a:bevel/>
-            <a:tailEnd type="triangle"/>
-          </a:ln>
-          <a:effectLst>
-            <a:outerShdw blurRad="38100" dist="20000" dir="5400000" rotWithShape="0">
-              <a:srgbClr val="000000">
-                <a:alpha val="38000"/>
-              </a:srgbClr>
-            </a:outerShdw>
-          </a:effectLst>
-        </p:spPr>
-        <p:style>
-          <a:lnRef idx="0">
-            <a:scrgbClr r="0" g="0" b="0"/>
-          </a:lnRef>
-          <a:fillRef idx="0">
-            <a:scrgbClr r="0" g="0" b="0"/>
-          </a:fillRef>
-          <a:effectRef idx="0">
-            <a:scrgbClr r="0" g="0" b="0"/>
-          </a:effectRef>
-          <a:fontRef idx="none"/>
-        </p:style>
-      </p:cxnSp>
-      <p:grpSp>
-        <p:nvGrpSpPr>
-          <p:cNvPr id="19" name="Group 18">
-            <a:extLst>
-              <a:ext uri="{FF2B5EF4-FFF2-40B4-BE49-F238E27FC236}">
-                <a16:creationId xmlns:a16="http://schemas.microsoft.com/office/drawing/2014/main" id="{632B18FC-5228-944A-8E58-402DE4701482}"/>
-              </a:ext>
-            </a:extLst>
-          </p:cNvPr>
-          <p:cNvGrpSpPr/>
-          <p:nvPr/>
-        </p:nvGrpSpPr>
-        <p:grpSpPr>
-          <a:xfrm>
-            <a:off x="6192731" y="5359930"/>
-            <a:ext cx="492443" cy="526043"/>
-            <a:chOff x="6192731" y="5359930"/>
-            <a:chExt cx="492443" cy="526043"/>
-          </a:xfrm>
-        </p:grpSpPr>
-        <p:cxnSp>
-          <p:nvCxnSpPr>
-            <p:cNvPr id="34" name="Straight Arrow Connector 33">
-              <a:extLst>
-                <a:ext uri="{FF2B5EF4-FFF2-40B4-BE49-F238E27FC236}">
-                  <a16:creationId xmlns:a16="http://schemas.microsoft.com/office/drawing/2014/main" id="{28C91D0E-A2F7-4740-8A9B-47F22AD8BA48}"/>
-                </a:ext>
-              </a:extLst>
-            </p:cNvPr>
-            <p:cNvCxnSpPr>
-              <a:cxnSpLocks/>
-            </p:cNvCxnSpPr>
-            <p:nvPr/>
-          </p:nvCxnSpPr>
-          <p:spPr>
-            <a:xfrm>
-              <a:off x="6437145" y="5359930"/>
-              <a:ext cx="0" cy="344516"/>
-            </a:xfrm>
-            <a:prstGeom prst="straightConnector1">
-              <a:avLst/>
-            </a:prstGeom>
-            <a:noFill/>
-            <a:ln w="25400" cap="flat">
-              <a:solidFill>
-                <a:schemeClr val="tx1"/>
-              </a:solidFill>
-              <a:prstDash val="solid"/>
-              <a:bevel/>
-              <a:tailEnd type="triangle"/>
-            </a:ln>
-            <a:effectLst>
-              <a:outerShdw blurRad="38100" dist="20000" dir="5400000" rotWithShape="0">
-                <a:srgbClr val="000000">
-                  <a:alpha val="38000"/>
-                </a:srgbClr>
-              </a:outerShdw>
-            </a:effectLst>
-          </p:spPr>
-          <p:style>
-            <a:lnRef idx="0">
-              <a:scrgbClr r="0" g="0" b="0"/>
-            </a:lnRef>
-            <a:fillRef idx="0">
-              <a:scrgbClr r="0" g="0" b="0"/>
-            </a:fillRef>
-            <a:effectRef idx="0">
-              <a:scrgbClr r="0" g="0" b="0"/>
-            </a:effectRef>
-            <a:fontRef idx="none"/>
-          </p:style>
-        </p:cxnSp>
-        <p:sp>
-          <p:nvSpPr>
-            <p:cNvPr id="35" name="Rectangle 34">
-              <a:extLst>
-                <a:ext uri="{FF2B5EF4-FFF2-40B4-BE49-F238E27FC236}">
-                  <a16:creationId xmlns:a16="http://schemas.microsoft.com/office/drawing/2014/main" id="{494F4A6A-FF42-2F4F-83C4-6BD8E698C5B6}"/>
-                </a:ext>
-              </a:extLst>
-            </p:cNvPr>
-            <p:cNvSpPr/>
-            <p:nvPr/>
-          </p:nvSpPr>
-          <p:spPr>
-            <a:xfrm>
-              <a:off x="6192731" y="5639752"/>
-              <a:ext cx="492443" cy="246221"/>
-            </a:xfrm>
-            <a:prstGeom prst="rect">
-              <a:avLst/>
-            </a:prstGeom>
-          </p:spPr>
-          <p:txBody>
-            <a:bodyPr wrap="none">
-              <a:spAutoFit/>
-            </a:bodyPr>
-            <a:lstStyle/>
-            <a:p>
-              <a:r>
-                <a:rPr lang="en-US" sz="1000" b="1" dirty="0">
-                  <a:solidFill>
-                    <a:schemeClr val="tx1"/>
-                  </a:solidFill>
-                  <a:latin typeface="Courier New" panose="02070309020205020404" pitchFamily="49" charset="0"/>
-                  <a:ea typeface="Consolas"/>
-                  <a:cs typeface="Courier New" panose="02070309020205020404" pitchFamily="49" charset="0"/>
-                  <a:sym typeface="Consolas"/>
-                </a:rPr>
-                <a:t>null</a:t>
-              </a:r>
-              <a:endParaRPr lang="en-US" sz="1000" dirty="0"/>
-            </a:p>
-          </p:txBody>
-        </p:sp>
-      </p:grpSp>
-      <p:grpSp>
-        <p:nvGrpSpPr>
-          <p:cNvPr id="40" name="Group 39">
-            <a:extLst>
-              <a:ext uri="{FF2B5EF4-FFF2-40B4-BE49-F238E27FC236}">
-                <a16:creationId xmlns:a16="http://schemas.microsoft.com/office/drawing/2014/main" id="{CC31F0CB-0130-8B42-AE43-4BBC6576BD30}"/>
-              </a:ext>
-            </a:extLst>
-          </p:cNvPr>
-          <p:cNvGrpSpPr/>
-          <p:nvPr/>
-        </p:nvGrpSpPr>
-        <p:grpSpPr>
-          <a:xfrm>
-            <a:off x="3767667" y="5359930"/>
-            <a:ext cx="492443" cy="526043"/>
-            <a:chOff x="6192731" y="5359930"/>
-            <a:chExt cx="492443" cy="526043"/>
-          </a:xfrm>
-        </p:grpSpPr>
-        <p:cxnSp>
-          <p:nvCxnSpPr>
-            <p:cNvPr id="41" name="Straight Arrow Connector 40">
-              <a:extLst>
-                <a:ext uri="{FF2B5EF4-FFF2-40B4-BE49-F238E27FC236}">
-                  <a16:creationId xmlns:a16="http://schemas.microsoft.com/office/drawing/2014/main" id="{A515E573-C2B9-044D-B3C3-888C1A2D2FD3}"/>
-                </a:ext>
-              </a:extLst>
-            </p:cNvPr>
-            <p:cNvCxnSpPr>
-              <a:cxnSpLocks/>
-            </p:cNvCxnSpPr>
-            <p:nvPr/>
-          </p:nvCxnSpPr>
-          <p:spPr>
-            <a:xfrm>
-              <a:off x="6437145" y="5359930"/>
-              <a:ext cx="0" cy="344516"/>
-            </a:xfrm>
-            <a:prstGeom prst="straightConnector1">
-              <a:avLst/>
-            </a:prstGeom>
-            <a:noFill/>
-            <a:ln w="25400" cap="flat">
-              <a:solidFill>
-                <a:schemeClr val="tx1"/>
-              </a:solidFill>
-              <a:prstDash val="solid"/>
-              <a:bevel/>
-              <a:tailEnd type="triangle"/>
-            </a:ln>
-            <a:effectLst>
-              <a:outerShdw blurRad="38100" dist="20000" dir="5400000" rotWithShape="0">
-                <a:srgbClr val="000000">
-                  <a:alpha val="38000"/>
-                </a:srgbClr>
-              </a:outerShdw>
-            </a:effectLst>
-          </p:spPr>
-          <p:style>
-            <a:lnRef idx="0">
-              <a:scrgbClr r="0" g="0" b="0"/>
-            </a:lnRef>
-            <a:fillRef idx="0">
-              <a:scrgbClr r="0" g="0" b="0"/>
-            </a:fillRef>
-            <a:effectRef idx="0">
-              <a:scrgbClr r="0" g="0" b="0"/>
-            </a:effectRef>
-            <a:fontRef idx="none"/>
-          </p:style>
-        </p:cxnSp>
-        <p:sp>
-          <p:nvSpPr>
-            <p:cNvPr id="42" name="Rectangle 41">
-              <a:extLst>
-                <a:ext uri="{FF2B5EF4-FFF2-40B4-BE49-F238E27FC236}">
-                  <a16:creationId xmlns:a16="http://schemas.microsoft.com/office/drawing/2014/main" id="{B0DE484E-2BF0-3F49-A373-893D7CA7D104}"/>
-                </a:ext>
-              </a:extLst>
-            </p:cNvPr>
-            <p:cNvSpPr/>
-            <p:nvPr/>
-          </p:nvSpPr>
-          <p:spPr>
-            <a:xfrm>
-              <a:off x="6192731" y="5639752"/>
-              <a:ext cx="492443" cy="246221"/>
-            </a:xfrm>
-            <a:prstGeom prst="rect">
-              <a:avLst/>
-            </a:prstGeom>
-          </p:spPr>
-          <p:txBody>
-            <a:bodyPr wrap="none">
-              <a:spAutoFit/>
-            </a:bodyPr>
-            <a:lstStyle/>
-            <a:p>
-              <a:r>
-                <a:rPr lang="en-US" sz="1000" b="1" dirty="0">
-                  <a:solidFill>
-                    <a:schemeClr val="tx1"/>
-                  </a:solidFill>
-                  <a:latin typeface="Courier New" panose="02070309020205020404" pitchFamily="49" charset="0"/>
-                  <a:ea typeface="Consolas"/>
-                  <a:cs typeface="Courier New" panose="02070309020205020404" pitchFamily="49" charset="0"/>
-                  <a:sym typeface="Consolas"/>
-                </a:rPr>
-                <a:t>null</a:t>
-              </a:r>
-              <a:endParaRPr lang="en-US" sz="1000" dirty="0"/>
-            </a:p>
-          </p:txBody>
-        </p:sp>
-      </p:grpSp>
-      <p:grpSp>
-        <p:nvGrpSpPr>
-          <p:cNvPr id="43" name="Group 42">
-            <a:extLst>
-              <a:ext uri="{FF2B5EF4-FFF2-40B4-BE49-F238E27FC236}">
-                <a16:creationId xmlns:a16="http://schemas.microsoft.com/office/drawing/2014/main" id="{DF9B4D6C-6CB4-7747-B93C-1E8FEBF49540}"/>
-              </a:ext>
-            </a:extLst>
-          </p:cNvPr>
-          <p:cNvGrpSpPr/>
-          <p:nvPr/>
-        </p:nvGrpSpPr>
-        <p:grpSpPr>
-          <a:xfrm>
-            <a:off x="4197229" y="5359930"/>
-            <a:ext cx="492443" cy="526043"/>
-            <a:chOff x="6192731" y="5359930"/>
-            <a:chExt cx="492443" cy="526043"/>
-          </a:xfrm>
-        </p:grpSpPr>
-        <p:cxnSp>
-          <p:nvCxnSpPr>
-            <p:cNvPr id="44" name="Straight Arrow Connector 43">
-              <a:extLst>
-                <a:ext uri="{FF2B5EF4-FFF2-40B4-BE49-F238E27FC236}">
-                  <a16:creationId xmlns:a16="http://schemas.microsoft.com/office/drawing/2014/main" id="{B955A53D-E59A-F740-9742-08A422043A59}"/>
-                </a:ext>
-              </a:extLst>
-            </p:cNvPr>
-            <p:cNvCxnSpPr>
-              <a:cxnSpLocks/>
-            </p:cNvCxnSpPr>
-            <p:nvPr/>
-          </p:nvCxnSpPr>
-          <p:spPr>
-            <a:xfrm>
-              <a:off x="6437145" y="5359930"/>
-              <a:ext cx="0" cy="344516"/>
-            </a:xfrm>
-            <a:prstGeom prst="straightConnector1">
-              <a:avLst/>
-            </a:prstGeom>
-            <a:noFill/>
-            <a:ln w="25400" cap="flat">
-              <a:solidFill>
-                <a:schemeClr val="tx1"/>
-              </a:solidFill>
-              <a:prstDash val="solid"/>
-              <a:bevel/>
-              <a:tailEnd type="triangle"/>
-            </a:ln>
-            <a:effectLst>
-              <a:outerShdw blurRad="38100" dist="20000" dir="5400000" rotWithShape="0">
-                <a:srgbClr val="000000">
-                  <a:alpha val="38000"/>
-                </a:srgbClr>
-              </a:outerShdw>
-            </a:effectLst>
-          </p:spPr>
-          <p:style>
-            <a:lnRef idx="0">
-              <a:scrgbClr r="0" g="0" b="0"/>
-            </a:lnRef>
-            <a:fillRef idx="0">
-              <a:scrgbClr r="0" g="0" b="0"/>
-            </a:fillRef>
-            <a:effectRef idx="0">
-              <a:scrgbClr r="0" g="0" b="0"/>
-            </a:effectRef>
-            <a:fontRef idx="none"/>
-          </p:style>
-        </p:cxnSp>
-        <p:sp>
-          <p:nvSpPr>
-            <p:cNvPr id="45" name="Rectangle 44">
-              <a:extLst>
-                <a:ext uri="{FF2B5EF4-FFF2-40B4-BE49-F238E27FC236}">
-                  <a16:creationId xmlns:a16="http://schemas.microsoft.com/office/drawing/2014/main" id="{0BDB6703-8032-7940-86A1-7BAF6813F4F1}"/>
-                </a:ext>
-              </a:extLst>
-            </p:cNvPr>
-            <p:cNvSpPr/>
-            <p:nvPr/>
-          </p:nvSpPr>
-          <p:spPr>
-            <a:xfrm>
-              <a:off x="6192731" y="5639752"/>
-              <a:ext cx="492443" cy="246221"/>
-            </a:xfrm>
-            <a:prstGeom prst="rect">
-              <a:avLst/>
-            </a:prstGeom>
-          </p:spPr>
-          <p:txBody>
-            <a:bodyPr wrap="none">
-              <a:spAutoFit/>
-            </a:bodyPr>
-            <a:lstStyle/>
-            <a:p>
-              <a:r>
-                <a:rPr lang="en-US" sz="1000" b="1" dirty="0">
-                  <a:solidFill>
-                    <a:schemeClr val="tx1"/>
-                  </a:solidFill>
-                  <a:latin typeface="Courier New" panose="02070309020205020404" pitchFamily="49" charset="0"/>
-                  <a:ea typeface="Consolas"/>
-                  <a:cs typeface="Courier New" panose="02070309020205020404" pitchFamily="49" charset="0"/>
-                  <a:sym typeface="Consolas"/>
-                </a:rPr>
-                <a:t>null</a:t>
-              </a:r>
-              <a:endParaRPr lang="en-US" sz="1000" dirty="0"/>
-            </a:p>
-          </p:txBody>
-        </p:sp>
-      </p:grpSp>
-      <p:grpSp>
-        <p:nvGrpSpPr>
-          <p:cNvPr id="46" name="Group 45">
-            <a:extLst>
-              <a:ext uri="{FF2B5EF4-FFF2-40B4-BE49-F238E27FC236}">
-                <a16:creationId xmlns:a16="http://schemas.microsoft.com/office/drawing/2014/main" id="{AABE6947-E7E8-6F4F-843D-A4736728A80E}"/>
-              </a:ext>
-            </a:extLst>
-          </p:cNvPr>
-          <p:cNvGrpSpPr/>
-          <p:nvPr/>
-        </p:nvGrpSpPr>
-        <p:grpSpPr>
-          <a:xfrm>
-            <a:off x="4593230" y="5359930"/>
-            <a:ext cx="492443" cy="526043"/>
-            <a:chOff x="6192731" y="5359930"/>
-            <a:chExt cx="492443" cy="526043"/>
-          </a:xfrm>
-        </p:grpSpPr>
-        <p:cxnSp>
-          <p:nvCxnSpPr>
-            <p:cNvPr id="47" name="Straight Arrow Connector 46">
-              <a:extLst>
-                <a:ext uri="{FF2B5EF4-FFF2-40B4-BE49-F238E27FC236}">
-                  <a16:creationId xmlns:a16="http://schemas.microsoft.com/office/drawing/2014/main" id="{C11F71BA-C035-654F-B256-0BD1D23ADEF6}"/>
-                </a:ext>
-              </a:extLst>
-            </p:cNvPr>
-            <p:cNvCxnSpPr>
-              <a:cxnSpLocks/>
-            </p:cNvCxnSpPr>
-            <p:nvPr/>
-          </p:nvCxnSpPr>
-          <p:spPr>
-            <a:xfrm>
-              <a:off x="6437145" y="5359930"/>
-              <a:ext cx="0" cy="344516"/>
-            </a:xfrm>
-            <a:prstGeom prst="straightConnector1">
-              <a:avLst/>
-            </a:prstGeom>
-            <a:noFill/>
-            <a:ln w="25400" cap="flat">
-              <a:solidFill>
-                <a:schemeClr val="tx1"/>
-              </a:solidFill>
-              <a:prstDash val="solid"/>
-              <a:bevel/>
-              <a:tailEnd type="triangle"/>
-            </a:ln>
-            <a:effectLst>
-              <a:outerShdw blurRad="38100" dist="20000" dir="5400000" rotWithShape="0">
-                <a:srgbClr val="000000">
-                  <a:alpha val="38000"/>
-                </a:srgbClr>
-              </a:outerShdw>
-            </a:effectLst>
-          </p:spPr>
-          <p:style>
-            <a:lnRef idx="0">
-              <a:scrgbClr r="0" g="0" b="0"/>
-            </a:lnRef>
-            <a:fillRef idx="0">
-              <a:scrgbClr r="0" g="0" b="0"/>
-            </a:fillRef>
-            <a:effectRef idx="0">
-              <a:scrgbClr r="0" g="0" b="0"/>
-            </a:effectRef>
-            <a:fontRef idx="none"/>
-          </p:style>
-        </p:cxnSp>
-        <p:sp>
-          <p:nvSpPr>
-            <p:cNvPr id="48" name="Rectangle 47">
-              <a:extLst>
-                <a:ext uri="{FF2B5EF4-FFF2-40B4-BE49-F238E27FC236}">
-                  <a16:creationId xmlns:a16="http://schemas.microsoft.com/office/drawing/2014/main" id="{5E85267E-B391-0C45-B263-0AFFDE55C966}"/>
-                </a:ext>
-              </a:extLst>
-            </p:cNvPr>
-            <p:cNvSpPr/>
-            <p:nvPr/>
-          </p:nvSpPr>
-          <p:spPr>
-            <a:xfrm>
-              <a:off x="6192731" y="5639752"/>
-              <a:ext cx="492443" cy="246221"/>
-            </a:xfrm>
-            <a:prstGeom prst="rect">
-              <a:avLst/>
-            </a:prstGeom>
-          </p:spPr>
-          <p:txBody>
-            <a:bodyPr wrap="none">
-              <a:spAutoFit/>
-            </a:bodyPr>
-            <a:lstStyle/>
-            <a:p>
-              <a:r>
-                <a:rPr lang="en-US" sz="1000" b="1" dirty="0">
-                  <a:solidFill>
-                    <a:schemeClr val="tx1"/>
-                  </a:solidFill>
-                  <a:latin typeface="Courier New" panose="02070309020205020404" pitchFamily="49" charset="0"/>
-                  <a:ea typeface="Consolas"/>
-                  <a:cs typeface="Courier New" panose="02070309020205020404" pitchFamily="49" charset="0"/>
-                  <a:sym typeface="Consolas"/>
-                </a:rPr>
-                <a:t>null</a:t>
-              </a:r>
-              <a:endParaRPr lang="en-US" sz="1000" dirty="0"/>
-            </a:p>
-          </p:txBody>
-        </p:sp>
-      </p:grpSp>
-      <p:grpSp>
-        <p:nvGrpSpPr>
-          <p:cNvPr id="49" name="Group 48">
-            <a:extLst>
-              <a:ext uri="{FF2B5EF4-FFF2-40B4-BE49-F238E27FC236}">
-                <a16:creationId xmlns:a16="http://schemas.microsoft.com/office/drawing/2014/main" id="{DD2C4DBE-FB2A-BC44-821B-C422E31BA9AA}"/>
-              </a:ext>
-            </a:extLst>
-          </p:cNvPr>
-          <p:cNvGrpSpPr/>
-          <p:nvPr/>
-        </p:nvGrpSpPr>
-        <p:grpSpPr>
-          <a:xfrm>
-            <a:off x="5005457" y="5359930"/>
-            <a:ext cx="492443" cy="534510"/>
-            <a:chOff x="6192731" y="5359930"/>
-            <a:chExt cx="492443" cy="534510"/>
-          </a:xfrm>
-        </p:grpSpPr>
-        <p:cxnSp>
-          <p:nvCxnSpPr>
-            <p:cNvPr id="50" name="Straight Arrow Connector 49">
-              <a:extLst>
-                <a:ext uri="{FF2B5EF4-FFF2-40B4-BE49-F238E27FC236}">
-                  <a16:creationId xmlns:a16="http://schemas.microsoft.com/office/drawing/2014/main" id="{F466DD90-8CC6-E44B-82CF-0E66C0B90C7A}"/>
-                </a:ext>
-              </a:extLst>
-            </p:cNvPr>
-            <p:cNvCxnSpPr>
-              <a:cxnSpLocks/>
-            </p:cNvCxnSpPr>
-            <p:nvPr/>
-          </p:nvCxnSpPr>
-          <p:spPr>
-            <a:xfrm>
-              <a:off x="6437145" y="5359930"/>
-              <a:ext cx="0" cy="344516"/>
-            </a:xfrm>
-            <a:prstGeom prst="straightConnector1">
-              <a:avLst/>
-            </a:prstGeom>
-            <a:noFill/>
-            <a:ln w="25400" cap="flat">
-              <a:solidFill>
-                <a:schemeClr val="tx1"/>
-              </a:solidFill>
-              <a:prstDash val="solid"/>
-              <a:bevel/>
-              <a:tailEnd type="triangle"/>
-            </a:ln>
-            <a:effectLst>
-              <a:outerShdw blurRad="38100" dist="20000" dir="5400000" rotWithShape="0">
-                <a:srgbClr val="000000">
-                  <a:alpha val="38000"/>
-                </a:srgbClr>
-              </a:outerShdw>
-            </a:effectLst>
-          </p:spPr>
-          <p:style>
-            <a:lnRef idx="0">
-              <a:scrgbClr r="0" g="0" b="0"/>
-            </a:lnRef>
-            <a:fillRef idx="0">
-              <a:scrgbClr r="0" g="0" b="0"/>
-            </a:fillRef>
-            <a:effectRef idx="0">
-              <a:scrgbClr r="0" g="0" b="0"/>
-            </a:effectRef>
-            <a:fontRef idx="none"/>
-          </p:style>
-        </p:cxnSp>
-        <p:sp>
-          <p:nvSpPr>
-            <p:cNvPr id="51" name="Rectangle 50">
-              <a:extLst>
-                <a:ext uri="{FF2B5EF4-FFF2-40B4-BE49-F238E27FC236}">
-                  <a16:creationId xmlns:a16="http://schemas.microsoft.com/office/drawing/2014/main" id="{47546E43-D720-BF4C-BE3D-6D93112DEB59}"/>
-                </a:ext>
-              </a:extLst>
-            </p:cNvPr>
-            <p:cNvSpPr/>
-            <p:nvPr/>
-          </p:nvSpPr>
-          <p:spPr>
-            <a:xfrm>
-              <a:off x="6192731" y="5648219"/>
-              <a:ext cx="492443" cy="246221"/>
-            </a:xfrm>
-            <a:prstGeom prst="rect">
-              <a:avLst/>
-            </a:prstGeom>
-          </p:spPr>
-          <p:txBody>
-            <a:bodyPr wrap="none">
-              <a:spAutoFit/>
-            </a:bodyPr>
-            <a:lstStyle/>
-            <a:p>
-              <a:r>
-                <a:rPr lang="en-US" sz="1000" b="1" dirty="0">
-                  <a:solidFill>
-                    <a:schemeClr val="tx1"/>
-                  </a:solidFill>
-                  <a:latin typeface="Courier New" panose="02070309020205020404" pitchFamily="49" charset="0"/>
-                  <a:ea typeface="Consolas"/>
-                  <a:cs typeface="Courier New" panose="02070309020205020404" pitchFamily="49" charset="0"/>
-                  <a:sym typeface="Consolas"/>
-                </a:rPr>
-                <a:t>null</a:t>
-              </a:r>
-              <a:endParaRPr lang="en-US" sz="1000" dirty="0"/>
-            </a:p>
-          </p:txBody>
-        </p:sp>
-      </p:grpSp>
-      <p:grpSp>
-        <p:nvGrpSpPr>
-          <p:cNvPr id="52" name="Group 51">
-            <a:extLst>
-              <a:ext uri="{FF2B5EF4-FFF2-40B4-BE49-F238E27FC236}">
-                <a16:creationId xmlns:a16="http://schemas.microsoft.com/office/drawing/2014/main" id="{180C694F-DF32-B94C-BF75-C233E405F137}"/>
-              </a:ext>
-            </a:extLst>
-          </p:cNvPr>
-          <p:cNvGrpSpPr/>
-          <p:nvPr/>
-        </p:nvGrpSpPr>
-        <p:grpSpPr>
-          <a:xfrm>
-            <a:off x="5403356" y="5359930"/>
-            <a:ext cx="492443" cy="526043"/>
-            <a:chOff x="6192731" y="5359930"/>
-            <a:chExt cx="492443" cy="526043"/>
-          </a:xfrm>
-        </p:grpSpPr>
-        <p:cxnSp>
-          <p:nvCxnSpPr>
-            <p:cNvPr id="53" name="Straight Arrow Connector 52">
-              <a:extLst>
-                <a:ext uri="{FF2B5EF4-FFF2-40B4-BE49-F238E27FC236}">
-                  <a16:creationId xmlns:a16="http://schemas.microsoft.com/office/drawing/2014/main" id="{2A6896E3-315F-8A40-BE17-91AC456C328B}"/>
-                </a:ext>
-              </a:extLst>
-            </p:cNvPr>
-            <p:cNvCxnSpPr>
-              <a:cxnSpLocks/>
-            </p:cNvCxnSpPr>
-            <p:nvPr/>
-          </p:nvCxnSpPr>
-          <p:spPr>
-            <a:xfrm>
-              <a:off x="6437145" y="5359930"/>
-              <a:ext cx="0" cy="344516"/>
-            </a:xfrm>
-            <a:prstGeom prst="straightConnector1">
-              <a:avLst/>
-            </a:prstGeom>
-            <a:noFill/>
-            <a:ln w="25400" cap="flat">
-              <a:solidFill>
-                <a:schemeClr val="tx1"/>
-              </a:solidFill>
-              <a:prstDash val="solid"/>
-              <a:bevel/>
-              <a:tailEnd type="triangle"/>
-            </a:ln>
-            <a:effectLst>
-              <a:outerShdw blurRad="38100" dist="20000" dir="5400000" rotWithShape="0">
-                <a:srgbClr val="000000">
-                  <a:alpha val="38000"/>
-                </a:srgbClr>
-              </a:outerShdw>
-            </a:effectLst>
-          </p:spPr>
-          <p:style>
-            <a:lnRef idx="0">
-              <a:scrgbClr r="0" g="0" b="0"/>
-            </a:lnRef>
-            <a:fillRef idx="0">
-              <a:scrgbClr r="0" g="0" b="0"/>
-            </a:fillRef>
-            <a:effectRef idx="0">
-              <a:scrgbClr r="0" g="0" b="0"/>
-            </a:effectRef>
-            <a:fontRef idx="none"/>
-          </p:style>
-        </p:cxnSp>
-        <p:sp>
-          <p:nvSpPr>
-            <p:cNvPr id="54" name="Rectangle 53">
-              <a:extLst>
-                <a:ext uri="{FF2B5EF4-FFF2-40B4-BE49-F238E27FC236}">
-                  <a16:creationId xmlns:a16="http://schemas.microsoft.com/office/drawing/2014/main" id="{8FB8883B-DC0A-C148-8DCB-BD1935A9FA44}"/>
-                </a:ext>
-              </a:extLst>
-            </p:cNvPr>
-            <p:cNvSpPr/>
-            <p:nvPr/>
-          </p:nvSpPr>
-          <p:spPr>
-            <a:xfrm>
-              <a:off x="6192731" y="5639752"/>
-              <a:ext cx="492443" cy="246221"/>
-            </a:xfrm>
-            <a:prstGeom prst="rect">
-              <a:avLst/>
-            </a:prstGeom>
-          </p:spPr>
-          <p:txBody>
-            <a:bodyPr wrap="none">
-              <a:spAutoFit/>
-            </a:bodyPr>
-            <a:lstStyle/>
-            <a:p>
-              <a:r>
-                <a:rPr lang="en-US" sz="1000" b="1" dirty="0">
-                  <a:solidFill>
-                    <a:schemeClr val="tx1"/>
-                  </a:solidFill>
-                  <a:latin typeface="Courier New" panose="02070309020205020404" pitchFamily="49" charset="0"/>
-                  <a:ea typeface="Consolas"/>
-                  <a:cs typeface="Courier New" panose="02070309020205020404" pitchFamily="49" charset="0"/>
-                  <a:sym typeface="Consolas"/>
-                </a:rPr>
-                <a:t>null</a:t>
-              </a:r>
-              <a:endParaRPr lang="en-US" sz="1000" dirty="0"/>
-            </a:p>
-          </p:txBody>
-        </p:sp>
-      </p:grpSp>
-      <p:grpSp>
-        <p:nvGrpSpPr>
-          <p:cNvPr id="55" name="Group 54">
-            <a:extLst>
-              <a:ext uri="{FF2B5EF4-FFF2-40B4-BE49-F238E27FC236}">
-                <a16:creationId xmlns:a16="http://schemas.microsoft.com/office/drawing/2014/main" id="{27F7BFD3-8E0D-C640-9497-A5F957C216E0}"/>
-              </a:ext>
-            </a:extLst>
-          </p:cNvPr>
-          <p:cNvGrpSpPr/>
-          <p:nvPr/>
-        </p:nvGrpSpPr>
-        <p:grpSpPr>
-          <a:xfrm>
-            <a:off x="5822495" y="5359930"/>
-            <a:ext cx="492443" cy="526043"/>
-            <a:chOff x="6192731" y="5359930"/>
-            <a:chExt cx="492443" cy="526043"/>
-          </a:xfrm>
-        </p:grpSpPr>
-        <p:cxnSp>
-          <p:nvCxnSpPr>
-            <p:cNvPr id="56" name="Straight Arrow Connector 55">
-              <a:extLst>
-                <a:ext uri="{FF2B5EF4-FFF2-40B4-BE49-F238E27FC236}">
-                  <a16:creationId xmlns:a16="http://schemas.microsoft.com/office/drawing/2014/main" id="{03DBD468-E8D1-7743-862D-AEE910687518}"/>
-                </a:ext>
-              </a:extLst>
-            </p:cNvPr>
-            <p:cNvCxnSpPr>
-              <a:cxnSpLocks/>
-            </p:cNvCxnSpPr>
-            <p:nvPr/>
-          </p:nvCxnSpPr>
-          <p:spPr>
-            <a:xfrm>
-              <a:off x="6437145" y="5359930"/>
-              <a:ext cx="0" cy="344516"/>
-            </a:xfrm>
-            <a:prstGeom prst="straightConnector1">
-              <a:avLst/>
-            </a:prstGeom>
-            <a:noFill/>
-            <a:ln w="25400" cap="flat">
-              <a:solidFill>
-                <a:schemeClr val="tx1"/>
-              </a:solidFill>
-              <a:prstDash val="solid"/>
-              <a:bevel/>
-              <a:tailEnd type="triangle"/>
-            </a:ln>
-            <a:effectLst>
-              <a:outerShdw blurRad="38100" dist="20000" dir="5400000" rotWithShape="0">
-                <a:srgbClr val="000000">
-                  <a:alpha val="38000"/>
-                </a:srgbClr>
-              </a:outerShdw>
-            </a:effectLst>
-          </p:spPr>
-          <p:style>
-            <a:lnRef idx="0">
-              <a:scrgbClr r="0" g="0" b="0"/>
-            </a:lnRef>
-            <a:fillRef idx="0">
-              <a:scrgbClr r="0" g="0" b="0"/>
-            </a:fillRef>
-            <a:effectRef idx="0">
-              <a:scrgbClr r="0" g="0" b="0"/>
-            </a:effectRef>
-            <a:fontRef idx="none"/>
-          </p:style>
-        </p:cxnSp>
-        <p:sp>
-          <p:nvSpPr>
-            <p:cNvPr id="57" name="Rectangle 56">
-              <a:extLst>
-                <a:ext uri="{FF2B5EF4-FFF2-40B4-BE49-F238E27FC236}">
-                  <a16:creationId xmlns:a16="http://schemas.microsoft.com/office/drawing/2014/main" id="{5A03C41B-F6DA-904A-8D5F-B3F2CF655449}"/>
-                </a:ext>
-              </a:extLst>
-            </p:cNvPr>
-            <p:cNvSpPr/>
-            <p:nvPr/>
-          </p:nvSpPr>
-          <p:spPr>
-            <a:xfrm>
-              <a:off x="6192731" y="5639752"/>
-              <a:ext cx="492443" cy="246221"/>
-            </a:xfrm>
-            <a:prstGeom prst="rect">
-              <a:avLst/>
-            </a:prstGeom>
-          </p:spPr>
-          <p:txBody>
-            <a:bodyPr wrap="none">
-              <a:spAutoFit/>
-            </a:bodyPr>
-            <a:lstStyle/>
-            <a:p>
-              <a:r>
-                <a:rPr lang="en-US" sz="1000" b="1" dirty="0">
-                  <a:solidFill>
-                    <a:schemeClr val="tx1"/>
-                  </a:solidFill>
-                  <a:latin typeface="Courier New" panose="02070309020205020404" pitchFamily="49" charset="0"/>
-                  <a:ea typeface="Consolas"/>
-                  <a:cs typeface="Courier New" panose="02070309020205020404" pitchFamily="49" charset="0"/>
-                  <a:sym typeface="Consolas"/>
-                </a:rPr>
-                <a:t>null</a:t>
-              </a:r>
-              <a:endParaRPr lang="en-US" sz="1000" dirty="0"/>
-            </a:p>
-          </p:txBody>
-        </p:sp>
-      </p:grpSp>
-      <p:grpSp>
-        <p:nvGrpSpPr>
-          <p:cNvPr id="58" name="Group 57">
-            <a:extLst>
-              <a:ext uri="{FF2B5EF4-FFF2-40B4-BE49-F238E27FC236}">
-                <a16:creationId xmlns:a16="http://schemas.microsoft.com/office/drawing/2014/main" id="{25C7410E-5AD1-8847-8DA3-D40BC1221776}"/>
-              </a:ext>
-            </a:extLst>
-          </p:cNvPr>
-          <p:cNvGrpSpPr/>
-          <p:nvPr/>
-        </p:nvGrpSpPr>
-        <p:grpSpPr>
-          <a:xfrm>
-            <a:off x="7429319" y="5359930"/>
-            <a:ext cx="492443" cy="526043"/>
-            <a:chOff x="6192731" y="5359930"/>
-            <a:chExt cx="492443" cy="526043"/>
-          </a:xfrm>
-        </p:grpSpPr>
-        <p:cxnSp>
-          <p:nvCxnSpPr>
-            <p:cNvPr id="59" name="Straight Arrow Connector 58">
-              <a:extLst>
-                <a:ext uri="{FF2B5EF4-FFF2-40B4-BE49-F238E27FC236}">
-                  <a16:creationId xmlns:a16="http://schemas.microsoft.com/office/drawing/2014/main" id="{745F5D15-35C7-7D4A-9006-BB7207449209}"/>
-                </a:ext>
-              </a:extLst>
-            </p:cNvPr>
-            <p:cNvCxnSpPr>
-              <a:cxnSpLocks/>
-            </p:cNvCxnSpPr>
-            <p:nvPr/>
-          </p:nvCxnSpPr>
-          <p:spPr>
-            <a:xfrm>
-              <a:off x="6437145" y="5359930"/>
-              <a:ext cx="0" cy="344516"/>
-            </a:xfrm>
-            <a:prstGeom prst="straightConnector1">
-              <a:avLst/>
-            </a:prstGeom>
-            <a:noFill/>
-            <a:ln w="25400" cap="flat">
-              <a:solidFill>
-                <a:schemeClr val="tx1"/>
-              </a:solidFill>
-              <a:prstDash val="solid"/>
-              <a:bevel/>
-              <a:tailEnd type="triangle"/>
-            </a:ln>
-            <a:effectLst>
-              <a:outerShdw blurRad="38100" dist="20000" dir="5400000" rotWithShape="0">
-                <a:srgbClr val="000000">
-                  <a:alpha val="38000"/>
-                </a:srgbClr>
-              </a:outerShdw>
-            </a:effectLst>
-          </p:spPr>
-          <p:style>
-            <a:lnRef idx="0">
-              <a:scrgbClr r="0" g="0" b="0"/>
-            </a:lnRef>
-            <a:fillRef idx="0">
-              <a:scrgbClr r="0" g="0" b="0"/>
-            </a:fillRef>
-            <a:effectRef idx="0">
-              <a:scrgbClr r="0" g="0" b="0"/>
-            </a:effectRef>
-            <a:fontRef idx="none"/>
-          </p:style>
-        </p:cxnSp>
-        <p:sp>
-          <p:nvSpPr>
-            <p:cNvPr id="60" name="Rectangle 59">
-              <a:extLst>
-                <a:ext uri="{FF2B5EF4-FFF2-40B4-BE49-F238E27FC236}">
-                  <a16:creationId xmlns:a16="http://schemas.microsoft.com/office/drawing/2014/main" id="{039D2E9B-4CC9-D64B-8DF0-13578E0CEFDA}"/>
-                </a:ext>
-              </a:extLst>
-            </p:cNvPr>
-            <p:cNvSpPr/>
-            <p:nvPr/>
-          </p:nvSpPr>
-          <p:spPr>
-            <a:xfrm>
-              <a:off x="6192731" y="5639752"/>
-              <a:ext cx="492443" cy="246221"/>
-            </a:xfrm>
-            <a:prstGeom prst="rect">
-              <a:avLst/>
-            </a:prstGeom>
-          </p:spPr>
-          <p:txBody>
-            <a:bodyPr wrap="none">
-              <a:spAutoFit/>
-            </a:bodyPr>
-            <a:lstStyle/>
-            <a:p>
-              <a:r>
-                <a:rPr lang="en-US" sz="1000" b="1" dirty="0">
-                  <a:solidFill>
-                    <a:schemeClr val="tx1"/>
-                  </a:solidFill>
-                  <a:latin typeface="Courier New" panose="02070309020205020404" pitchFamily="49" charset="0"/>
-                  <a:ea typeface="Consolas"/>
-                  <a:cs typeface="Courier New" panose="02070309020205020404" pitchFamily="49" charset="0"/>
-                  <a:sym typeface="Consolas"/>
-                </a:rPr>
-                <a:t>null</a:t>
-              </a:r>
-              <a:endParaRPr lang="en-US" sz="1000" dirty="0"/>
-            </a:p>
-          </p:txBody>
-        </p:sp>
-      </p:grpSp>
-      <p:grpSp>
-        <p:nvGrpSpPr>
-          <p:cNvPr id="61" name="Group 60">
-            <a:extLst>
-              <a:ext uri="{FF2B5EF4-FFF2-40B4-BE49-F238E27FC236}">
-                <a16:creationId xmlns:a16="http://schemas.microsoft.com/office/drawing/2014/main" id="{F8D7F8CD-A9B3-FD42-AE1C-1F6915CC00F1}"/>
-              </a:ext>
-            </a:extLst>
-          </p:cNvPr>
-          <p:cNvGrpSpPr/>
-          <p:nvPr/>
-        </p:nvGrpSpPr>
-        <p:grpSpPr>
-          <a:xfrm>
-            <a:off x="7006907" y="5359930"/>
-            <a:ext cx="492443" cy="526043"/>
-            <a:chOff x="6192731" y="5359930"/>
-            <a:chExt cx="492443" cy="526043"/>
-          </a:xfrm>
-        </p:grpSpPr>
-        <p:cxnSp>
-          <p:nvCxnSpPr>
-            <p:cNvPr id="62" name="Straight Arrow Connector 61">
-              <a:extLst>
-                <a:ext uri="{FF2B5EF4-FFF2-40B4-BE49-F238E27FC236}">
-                  <a16:creationId xmlns:a16="http://schemas.microsoft.com/office/drawing/2014/main" id="{D9BC7035-9FF5-124E-9138-0EDF118A4946}"/>
-                </a:ext>
-              </a:extLst>
-            </p:cNvPr>
-            <p:cNvCxnSpPr>
-              <a:cxnSpLocks/>
-            </p:cNvCxnSpPr>
-            <p:nvPr/>
-          </p:nvCxnSpPr>
-          <p:spPr>
-            <a:xfrm>
-              <a:off x="6437145" y="5359930"/>
-              <a:ext cx="0" cy="344516"/>
-            </a:xfrm>
-            <a:prstGeom prst="straightConnector1">
-              <a:avLst/>
-            </a:prstGeom>
-            <a:noFill/>
-            <a:ln w="25400" cap="flat">
-              <a:solidFill>
-                <a:schemeClr val="tx1"/>
-              </a:solidFill>
-              <a:prstDash val="solid"/>
-              <a:bevel/>
-              <a:tailEnd type="triangle"/>
-            </a:ln>
-            <a:effectLst>
-              <a:outerShdw blurRad="38100" dist="20000" dir="5400000" rotWithShape="0">
-                <a:srgbClr val="000000">
-                  <a:alpha val="38000"/>
-                </a:srgbClr>
-              </a:outerShdw>
-            </a:effectLst>
-          </p:spPr>
-          <p:style>
-            <a:lnRef idx="0">
-              <a:scrgbClr r="0" g="0" b="0"/>
-            </a:lnRef>
-            <a:fillRef idx="0">
-              <a:scrgbClr r="0" g="0" b="0"/>
-            </a:fillRef>
-            <a:effectRef idx="0">
-              <a:scrgbClr r="0" g="0" b="0"/>
-            </a:effectRef>
-            <a:fontRef idx="none"/>
-          </p:style>
-        </p:cxnSp>
-        <p:sp>
-          <p:nvSpPr>
-            <p:cNvPr id="63" name="Rectangle 62">
-              <a:extLst>
-                <a:ext uri="{FF2B5EF4-FFF2-40B4-BE49-F238E27FC236}">
-                  <a16:creationId xmlns:a16="http://schemas.microsoft.com/office/drawing/2014/main" id="{58AE4631-C716-4B49-A95B-BE94270F5A6E}"/>
-                </a:ext>
-              </a:extLst>
-            </p:cNvPr>
-            <p:cNvSpPr/>
-            <p:nvPr/>
-          </p:nvSpPr>
-          <p:spPr>
-            <a:xfrm>
-              <a:off x="6192731" y="5639752"/>
-              <a:ext cx="492443" cy="246221"/>
-            </a:xfrm>
-            <a:prstGeom prst="rect">
-              <a:avLst/>
-            </a:prstGeom>
-          </p:spPr>
-          <p:txBody>
-            <a:bodyPr wrap="none">
-              <a:spAutoFit/>
-            </a:bodyPr>
-            <a:lstStyle/>
-            <a:p>
-              <a:r>
-                <a:rPr lang="en-US" sz="1000" b="1" dirty="0">
-                  <a:solidFill>
-                    <a:schemeClr val="tx1"/>
-                  </a:solidFill>
-                  <a:latin typeface="Courier New" panose="02070309020205020404" pitchFamily="49" charset="0"/>
-                  <a:ea typeface="Consolas"/>
-                  <a:cs typeface="Courier New" panose="02070309020205020404" pitchFamily="49" charset="0"/>
-                  <a:sym typeface="Consolas"/>
-                </a:rPr>
-                <a:t>null</a:t>
-              </a:r>
-              <a:endParaRPr lang="en-US" sz="1000" dirty="0"/>
-            </a:p>
-          </p:txBody>
-        </p:sp>
-      </p:grpSp>
-      <p:grpSp>
-        <p:nvGrpSpPr>
-          <p:cNvPr id="64" name="Group 63">
-            <a:extLst>
-              <a:ext uri="{FF2B5EF4-FFF2-40B4-BE49-F238E27FC236}">
-                <a16:creationId xmlns:a16="http://schemas.microsoft.com/office/drawing/2014/main" id="{3945A6ED-523A-844D-BC7E-B82427E7F165}"/>
-              </a:ext>
-            </a:extLst>
-          </p:cNvPr>
-          <p:cNvGrpSpPr/>
-          <p:nvPr/>
-        </p:nvGrpSpPr>
-        <p:grpSpPr>
-          <a:xfrm>
-            <a:off x="6607656" y="5359930"/>
-            <a:ext cx="492443" cy="526043"/>
-            <a:chOff x="6192731" y="5359930"/>
-            <a:chExt cx="492443" cy="526043"/>
-          </a:xfrm>
-        </p:grpSpPr>
-        <p:cxnSp>
-          <p:nvCxnSpPr>
-            <p:cNvPr id="65" name="Straight Arrow Connector 64">
-              <a:extLst>
-                <a:ext uri="{FF2B5EF4-FFF2-40B4-BE49-F238E27FC236}">
-                  <a16:creationId xmlns:a16="http://schemas.microsoft.com/office/drawing/2014/main" id="{D82D6F6D-8741-F84C-ADAB-3DB6623FBF24}"/>
-                </a:ext>
-              </a:extLst>
-            </p:cNvPr>
-            <p:cNvCxnSpPr>
-              <a:cxnSpLocks/>
-            </p:cNvCxnSpPr>
-            <p:nvPr/>
-          </p:nvCxnSpPr>
-          <p:spPr>
-            <a:xfrm>
-              <a:off x="6437145" y="5359930"/>
-              <a:ext cx="0" cy="344516"/>
-            </a:xfrm>
-            <a:prstGeom prst="straightConnector1">
-              <a:avLst/>
-            </a:prstGeom>
-            <a:noFill/>
-            <a:ln w="25400" cap="flat">
-              <a:solidFill>
-                <a:schemeClr val="tx1"/>
-              </a:solidFill>
-              <a:prstDash val="solid"/>
-              <a:bevel/>
-              <a:tailEnd type="triangle"/>
-            </a:ln>
-            <a:effectLst>
-              <a:outerShdw blurRad="38100" dist="20000" dir="5400000" rotWithShape="0">
-                <a:srgbClr val="000000">
-                  <a:alpha val="38000"/>
-                </a:srgbClr>
-              </a:outerShdw>
-            </a:effectLst>
-          </p:spPr>
-          <p:style>
-            <a:lnRef idx="0">
-              <a:scrgbClr r="0" g="0" b="0"/>
-            </a:lnRef>
-            <a:fillRef idx="0">
-              <a:scrgbClr r="0" g="0" b="0"/>
-            </a:fillRef>
-            <a:effectRef idx="0">
-              <a:scrgbClr r="0" g="0" b="0"/>
-            </a:effectRef>
-            <a:fontRef idx="none"/>
-          </p:style>
-        </p:cxnSp>
-        <p:sp>
-          <p:nvSpPr>
-            <p:cNvPr id="66" name="Rectangle 65">
-              <a:extLst>
-                <a:ext uri="{FF2B5EF4-FFF2-40B4-BE49-F238E27FC236}">
-                  <a16:creationId xmlns:a16="http://schemas.microsoft.com/office/drawing/2014/main" id="{55EF83A8-6A11-EB45-BD70-88085AC899CE}"/>
-                </a:ext>
-              </a:extLst>
-            </p:cNvPr>
-            <p:cNvSpPr/>
-            <p:nvPr/>
-          </p:nvSpPr>
-          <p:spPr>
-            <a:xfrm>
-              <a:off x="6192731" y="5639752"/>
-              <a:ext cx="492443" cy="246221"/>
-            </a:xfrm>
-            <a:prstGeom prst="rect">
-              <a:avLst/>
-            </a:prstGeom>
-          </p:spPr>
-          <p:txBody>
-            <a:bodyPr wrap="none">
-              <a:spAutoFit/>
-            </a:bodyPr>
-            <a:lstStyle/>
-            <a:p>
-              <a:r>
-                <a:rPr lang="en-US" sz="1000" b="1" dirty="0">
-                  <a:solidFill>
-                    <a:schemeClr val="tx1"/>
-                  </a:solidFill>
-                  <a:latin typeface="Courier New" panose="02070309020205020404" pitchFamily="49" charset="0"/>
-                  <a:ea typeface="Consolas"/>
-                  <a:cs typeface="Courier New" panose="02070309020205020404" pitchFamily="49" charset="0"/>
-                  <a:sym typeface="Consolas"/>
-                </a:rPr>
-                <a:t>null</a:t>
-              </a:r>
-              <a:endParaRPr lang="en-US" sz="1000" dirty="0"/>
-            </a:p>
-          </p:txBody>
-        </p:sp>
-      </p:grpSp>
     </p:spTree>
     <p:extLst>
       <p:ext uri="{BB962C8B-B14F-4D97-AF65-F5344CB8AC3E}">

</xml_diff>